<commit_message>
updated presentazione std and added presentazione tecnica.docx
</commit_message>
<xml_diff>
--- a/presentazione.pptx
+++ b/presentazione.pptx
@@ -5,10 +5,10 @@
     <p:sldMasterId id="2147483717" r:id="rId4"/>
   </p:sldMasterIdLst>
   <p:notesMasterIdLst>
-    <p:notesMasterId r:id="rId15"/>
+    <p:notesMasterId r:id="rId16"/>
   </p:notesMasterIdLst>
   <p:handoutMasterIdLst>
-    <p:handoutMasterId r:id="rId16"/>
+    <p:handoutMasterId r:id="rId17"/>
   </p:handoutMasterIdLst>
   <p:sldIdLst>
     <p:sldId id="258" r:id="rId5"/>
@@ -16,11 +16,12 @@
     <p:sldId id="293" r:id="rId7"/>
     <p:sldId id="295" r:id="rId8"/>
     <p:sldId id="294" r:id="rId9"/>
-    <p:sldId id="291" r:id="rId10"/>
-    <p:sldId id="296" r:id="rId11"/>
-    <p:sldId id="299" r:id="rId12"/>
-    <p:sldId id="300" r:id="rId13"/>
-    <p:sldId id="297" r:id="rId14"/>
+    <p:sldId id="301" r:id="rId10"/>
+    <p:sldId id="303" r:id="rId11"/>
+    <p:sldId id="304" r:id="rId12"/>
+    <p:sldId id="302" r:id="rId13"/>
+    <p:sldId id="299" r:id="rId14"/>
+    <p:sldId id="305" r:id="rId15"/>
   </p:sldIdLst>
   <p:sldSz cx="12192000" cy="6858000"/>
   <p:notesSz cx="6858000" cy="9144000"/>
@@ -226,7 +227,7 @@
             <a:pPr rtl="0"/>
             <a:fld id="{36FC0A7B-6666-4F41-AD03-C74B76B10001}" type="datetime1">
               <a:rPr lang="it-IT" smtClean="0"/>
-              <a:t>30/10/2022</a:t>
+              <a:t>06/11/2022</a:t>
             </a:fld>
             <a:endParaRPr lang="it-IT" dirty="0"/>
           </a:p>
@@ -407,7 +408,7 @@
             <a:fld id="{110E367B-2E0B-461C-8280-86016408BD7C}" type="datetime1">
               <a:rPr lang="it-IT" smtClean="0"/>
               <a:pPr/>
-              <a:t>30/10/2022</a:t>
+              <a:t>06/11/2022</a:t>
             </a:fld>
             <a:endParaRPr lang="it-IT" dirty="0"/>
           </a:p>
@@ -839,7 +840,93 @@
     </p:spTree>
     <p:extLst>
       <p:ext uri="{BB962C8B-B14F-4D97-AF65-F5344CB8AC3E}">
-        <p14:creationId xmlns:p14="http://schemas.microsoft.com/office/powerpoint/2010/main" val="874336744"/>
+        <p14:creationId xmlns:p14="http://schemas.microsoft.com/office/powerpoint/2010/main" val="2110661221"/>
+      </p:ext>
+    </p:extLst>
+  </p:cSld>
+  <p:clrMapOvr>
+    <a:masterClrMapping/>
+  </p:clrMapOvr>
+</p:notes>
+</file>
+
+<file path=ppt/notesSlides/notesSlide11.xml><?xml version="1.0" encoding="utf-8"?>
+<p:notes xmlns:a="http://schemas.openxmlformats.org/drawingml/2006/main" xmlns:r="http://schemas.openxmlformats.org/officeDocument/2006/relationships" xmlns:p="http://schemas.openxmlformats.org/presentationml/2006/main">
+  <p:cSld>
+    <p:spTree>
+      <p:nvGrpSpPr>
+        <p:cNvPr id="1" name=""/>
+        <p:cNvGrpSpPr/>
+        <p:nvPr/>
+      </p:nvGrpSpPr>
+      <p:grpSpPr>
+        <a:xfrm>
+          <a:off x="0" y="0"/>
+          <a:ext cx="0" cy="0"/>
+          <a:chOff x="0" y="0"/>
+          <a:chExt cx="0" cy="0"/>
+        </a:xfrm>
+      </p:grpSpPr>
+      <p:sp>
+        <p:nvSpPr>
+          <p:cNvPr id="2" name="Segnaposto immagine diapositiva 1"/>
+          <p:cNvSpPr>
+            <a:spLocks noGrp="1" noRot="1" noChangeAspect="1"/>
+          </p:cNvSpPr>
+          <p:nvPr>
+            <p:ph type="sldImg"/>
+          </p:nvPr>
+        </p:nvSpPr>
+        <p:spPr/>
+      </p:sp>
+      <p:sp>
+        <p:nvSpPr>
+          <p:cNvPr id="3" name="Segnaposto note 2"/>
+          <p:cNvSpPr>
+            <a:spLocks noGrp="1"/>
+          </p:cNvSpPr>
+          <p:nvPr>
+            <p:ph type="body" idx="1"/>
+          </p:nvPr>
+        </p:nvSpPr>
+        <p:spPr/>
+        <p:txBody>
+          <a:bodyPr rtlCol="0"/>
+          <a:lstStyle/>
+          <a:p>
+            <a:pPr rtl="0"/>
+            <a:endParaRPr lang="it-IT" dirty="0"/>
+          </a:p>
+        </p:txBody>
+      </p:sp>
+      <p:sp>
+        <p:nvSpPr>
+          <p:cNvPr id="4" name="Segnaposto numero diapositiva 3"/>
+          <p:cNvSpPr>
+            <a:spLocks noGrp="1"/>
+          </p:cNvSpPr>
+          <p:nvPr>
+            <p:ph type="sldNum" sz="quarter" idx="10"/>
+          </p:nvPr>
+        </p:nvSpPr>
+        <p:spPr/>
+        <p:txBody>
+          <a:bodyPr rtlCol="0"/>
+          <a:lstStyle/>
+          <a:p>
+            <a:pPr rtl="0"/>
+            <a:fld id="{284ECAD9-32EE-4091-BDA5-6BD15ACC5E58}" type="slidenum">
+              <a:rPr lang="it-IT" smtClean="0"/>
+              <a:t>11</a:t>
+            </a:fld>
+            <a:endParaRPr lang="it-IT" dirty="0"/>
+          </a:p>
+        </p:txBody>
+      </p:sp>
+    </p:spTree>
+    <p:extLst>
+      <p:ext uri="{BB962C8B-B14F-4D97-AF65-F5344CB8AC3E}">
+        <p14:creationId xmlns:p14="http://schemas.microsoft.com/office/powerpoint/2010/main" val="3566257541"/>
       </p:ext>
     </p:extLst>
   </p:cSld>
@@ -1249,7 +1336,7 @@
             <a:spLocks noGrp="1"/>
           </p:cNvSpPr>
           <p:nvPr>
-            <p:ph type="sldNum" sz="quarter" idx="5"/>
+            <p:ph type="sldNum" sz="quarter" idx="10"/>
           </p:nvPr>
         </p:nvSpPr>
         <p:spPr/>
@@ -1269,7 +1356,7 @@
     </p:spTree>
     <p:extLst>
       <p:ext uri="{BB962C8B-B14F-4D97-AF65-F5344CB8AC3E}">
-        <p14:creationId xmlns:p14="http://schemas.microsoft.com/office/powerpoint/2010/main" val="3085169549"/>
+        <p14:creationId xmlns:p14="http://schemas.microsoft.com/office/powerpoint/2010/main" val="2287645428"/>
       </p:ext>
     </p:extLst>
   </p:cSld>
@@ -1335,7 +1422,7 @@
             <a:spLocks noGrp="1"/>
           </p:cNvSpPr>
           <p:nvPr>
-            <p:ph type="sldNum" sz="quarter" idx="5"/>
+            <p:ph type="sldNum" sz="quarter" idx="10"/>
           </p:nvPr>
         </p:nvSpPr>
         <p:spPr/>
@@ -1355,7 +1442,7 @@
     </p:spTree>
     <p:extLst>
       <p:ext uri="{BB962C8B-B14F-4D97-AF65-F5344CB8AC3E}">
-        <p14:creationId xmlns:p14="http://schemas.microsoft.com/office/powerpoint/2010/main" val="3980984744"/>
+        <p14:creationId xmlns:p14="http://schemas.microsoft.com/office/powerpoint/2010/main" val="2034191388"/>
       </p:ext>
     </p:extLst>
   </p:cSld>
@@ -1421,7 +1508,7 @@
             <a:spLocks noGrp="1"/>
           </p:cNvSpPr>
           <p:nvPr>
-            <p:ph type="sldNum" sz="quarter" idx="5"/>
+            <p:ph type="sldNum" sz="quarter" idx="10"/>
           </p:nvPr>
         </p:nvSpPr>
         <p:spPr/>
@@ -1441,7 +1528,7 @@
     </p:spTree>
     <p:extLst>
       <p:ext uri="{BB962C8B-B14F-4D97-AF65-F5344CB8AC3E}">
-        <p14:creationId xmlns:p14="http://schemas.microsoft.com/office/powerpoint/2010/main" val="2110661221"/>
+        <p14:creationId xmlns:p14="http://schemas.microsoft.com/office/powerpoint/2010/main" val="2283268863"/>
       </p:ext>
     </p:extLst>
   </p:cSld>
@@ -1527,7 +1614,7 @@
     </p:spTree>
     <p:extLst>
       <p:ext uri="{BB962C8B-B14F-4D97-AF65-F5344CB8AC3E}">
-        <p14:creationId xmlns:p14="http://schemas.microsoft.com/office/powerpoint/2010/main" val="2727431715"/>
+        <p14:creationId xmlns:p14="http://schemas.microsoft.com/office/powerpoint/2010/main" val="315041612"/>
       </p:ext>
     </p:extLst>
   </p:cSld>
@@ -1613,7 +1700,7 @@
             <a:pPr rtl="0"/>
             <a:fld id="{BC5A5791-EFA9-42A2-8E0D-DBC7A027EB39}" type="datetime1">
               <a:rPr lang="it-IT" noProof="0" smtClean="0"/>
-              <a:t>30/10/2022</a:t>
+              <a:t>06/11/2022</a:t>
             </a:fld>
             <a:endParaRPr lang="it-IT" noProof="0" dirty="0"/>
           </a:p>
@@ -2241,7 +2328,7 @@
             <a:pPr rtl="0"/>
             <a:fld id="{FF17C169-DBE1-4B6A-9921-1E108A1C6C42}" type="datetime1">
               <a:rPr lang="it-IT" noProof="0" smtClean="0"/>
-              <a:t>30/10/2022</a:t>
+              <a:t>06/11/2022</a:t>
             </a:fld>
             <a:endParaRPr lang="it-IT" noProof="0" dirty="0"/>
           </a:p>
@@ -2598,7 +2685,7 @@
             <a:pPr rtl="0"/>
             <a:fld id="{6C0ABBAF-B24C-4448-B75C-ADB9350121F9}" type="datetime1">
               <a:rPr lang="it-IT" noProof="0" smtClean="0"/>
-              <a:t>30/10/2022</a:t>
+              <a:t>06/11/2022</a:t>
             </a:fld>
             <a:endParaRPr lang="it-IT" noProof="0" dirty="0"/>
           </a:p>
@@ -2997,7 +3084,7 @@
             <a:pPr rtl="0"/>
             <a:fld id="{26E56894-810F-46F6-9A4E-7CB650138CD2}" type="datetime1">
               <a:rPr lang="it-IT" noProof="0" smtClean="0"/>
-              <a:t>30/10/2022</a:t>
+              <a:t>06/11/2022</a:t>
             </a:fld>
             <a:endParaRPr lang="it-IT" noProof="0" dirty="0"/>
           </a:p>
@@ -3480,7 +3567,7 @@
             <a:pPr rtl="0"/>
             <a:fld id="{6BDF9918-2BB5-43D7-98E9-1FB3954C3638}" type="datetime1">
               <a:rPr lang="it-IT" noProof="0" smtClean="0"/>
-              <a:t>30/10/2022</a:t>
+              <a:t>06/11/2022</a:t>
             </a:fld>
             <a:endParaRPr lang="it-IT" noProof="0" dirty="0"/>
           </a:p>
@@ -3871,7 +3958,7 @@
             <a:pPr rtl="0"/>
             <a:fld id="{983F2180-7340-4006-8F9F-3B15285D3035}" type="datetime1">
               <a:rPr lang="it-IT" noProof="0" smtClean="0"/>
-              <a:t>30/10/2022</a:t>
+              <a:t>06/11/2022</a:t>
             </a:fld>
             <a:endParaRPr lang="it-IT" noProof="0" dirty="0"/>
           </a:p>
@@ -4239,7 +4326,7 @@
             <a:pPr rtl="0"/>
             <a:fld id="{47C567FE-B98A-4D3F-9213-316EA9EC55A5}" type="datetime1">
               <a:rPr lang="it-IT" noProof="0" smtClean="0"/>
-              <a:t>30/10/2022</a:t>
+              <a:t>06/11/2022</a:t>
             </a:fld>
             <a:endParaRPr lang="it-IT" noProof="0" dirty="0"/>
           </a:p>
@@ -4732,7 +4819,7 @@
             <a:pPr rtl="0"/>
             <a:fld id="{BC922104-62E9-446F-9FB1-A32B08927891}" type="datetime1">
               <a:rPr lang="it-IT" noProof="0" smtClean="0"/>
-              <a:t>30/10/2022</a:t>
+              <a:t>06/11/2022</a:t>
             </a:fld>
             <a:endParaRPr lang="it-IT" noProof="0" dirty="0"/>
           </a:p>
@@ -5232,7 +5319,7 @@
             <a:pPr rtl="0"/>
             <a:fld id="{192B49F1-2FC8-466C-ABE0-4929E08403C1}" type="datetime1">
               <a:rPr lang="it-IT" noProof="0" smtClean="0"/>
-              <a:t>30/10/2022</a:t>
+              <a:t>06/11/2022</a:t>
             </a:fld>
             <a:endParaRPr lang="it-IT" noProof="0" dirty="0"/>
           </a:p>
@@ -5669,7 +5756,7 @@
             <a:pPr rtl="0"/>
             <a:fld id="{D669DC07-792B-4D17-B0C3-BB835168107E}" type="datetime1">
               <a:rPr lang="it-IT" noProof="0" smtClean="0"/>
-              <a:t>30/10/2022</a:t>
+              <a:t>06/11/2022</a:t>
             </a:fld>
             <a:endParaRPr lang="it-IT" noProof="0" dirty="0"/>
           </a:p>
@@ -5926,7 +6013,7 @@
             <a:pPr rtl="0"/>
             <a:fld id="{C95873E1-B6E7-4F22-ACBC-2B4E759526F9}" type="datetime1">
               <a:rPr lang="it-IT" noProof="0" smtClean="0"/>
-              <a:t>30/10/2022</a:t>
+              <a:t>06/11/2022</a:t>
             </a:fld>
             <a:endParaRPr lang="it-IT" noProof="0" dirty="0"/>
           </a:p>
@@ -6159,7 +6246,7 @@
             <a:pPr rtl="0"/>
             <a:fld id="{EDF35B73-1E84-4E1D-9C62-04B6DA1DCD89}" type="datetime1">
               <a:rPr lang="it-IT" noProof="0" smtClean="0"/>
-              <a:t>30/10/2022</a:t>
+              <a:t>06/11/2022</a:t>
             </a:fld>
             <a:endParaRPr lang="it-IT" noProof="0" dirty="0"/>
           </a:p>
@@ -6567,7 +6654,7 @@
             <a:pPr rtl="0"/>
             <a:fld id="{EF217D74-4249-45DE-AFC1-DB41000B186F}" type="datetime1">
               <a:rPr lang="it-IT" noProof="0" smtClean="0"/>
-              <a:t>30/10/2022</a:t>
+              <a:t>06/11/2022</a:t>
             </a:fld>
             <a:endParaRPr lang="it-IT" noProof="0" dirty="0"/>
           </a:p>
@@ -6811,7 +6898,7 @@
             <a:pPr rtl="0"/>
             <a:fld id="{02821AFD-43C1-409E-AABC-CA19CBFB6E3C}" type="datetime1">
               <a:rPr lang="it-IT" noProof="0" smtClean="0"/>
-              <a:t>30/10/2022</a:t>
+              <a:t>06/11/2022</a:t>
             </a:fld>
             <a:endParaRPr lang="it-IT" noProof="0" dirty="0"/>
           </a:p>
@@ -7011,7 +7098,7 @@
             <a:pPr rtl="0"/>
             <a:fld id="{25D5A028-43A2-4639-BEEA-82C2B46D2F75}" type="datetime1">
               <a:rPr lang="it-IT" noProof="0" smtClean="0"/>
-              <a:t>30/10/2022</a:t>
+              <a:t>06/11/2022</a:t>
             </a:fld>
             <a:endParaRPr lang="it-IT" noProof="0" dirty="0"/>
           </a:p>
@@ -7471,7 +7558,7 @@
             <a:pPr rtl="0"/>
             <a:fld id="{0AC1AF47-3649-4D70-8624-44F2D47949BF}" type="datetime1">
               <a:rPr lang="it-IT" noProof="0" smtClean="0"/>
-              <a:t>30/10/2022</a:t>
+              <a:t>06/11/2022</a:t>
             </a:fld>
             <a:endParaRPr lang="it-IT" noProof="0" dirty="0"/>
           </a:p>
@@ -8055,7 +8142,7 @@
             <a:pPr rtl="0"/>
             <a:fld id="{0C86549E-7F36-460D-B45B-E31862ACF4DC}" type="datetime1">
               <a:rPr lang="it-IT" noProof="0" smtClean="0"/>
-              <a:t>30/10/2022</a:t>
+              <a:t>06/11/2022</a:t>
             </a:fld>
             <a:endParaRPr lang="it-IT" noProof="0" dirty="0"/>
           </a:p>
@@ -8459,7 +8546,7 @@
             <a:pPr rtl="0"/>
             <a:fld id="{5AD476CA-C764-4FAD-8146-5EA1029A9E33}" type="datetime1">
               <a:rPr lang="it-IT" noProof="0" smtClean="0"/>
-              <a:t>30/10/2022</a:t>
+              <a:t>06/11/2022</a:t>
             </a:fld>
             <a:endParaRPr lang="it-IT" noProof="0" dirty="0"/>
           </a:p>
@@ -8602,7 +8689,7 @@
             <a:pPr rtl="0"/>
             <a:fld id="{8718CE71-08A2-40CC-B75F-5DA9EAC27385}" type="datetime1">
               <a:rPr lang="it-IT" noProof="0" smtClean="0"/>
-              <a:t>30/10/2022</a:t>
+              <a:t>06/11/2022</a:t>
             </a:fld>
             <a:endParaRPr lang="it-IT" noProof="0" dirty="0"/>
           </a:p>
@@ -8794,7 +8881,7 @@
             <a:pPr rtl="0"/>
             <a:fld id="{2F6EAE58-4589-466E-80D1-72C9CC21B379}" type="datetime1">
               <a:rPr lang="it-IT" noProof="0" smtClean="0"/>
-              <a:t>30/10/2022</a:t>
+              <a:t>06/11/2022</a:t>
             </a:fld>
             <a:endParaRPr lang="it-IT" noProof="0" dirty="0"/>
           </a:p>
@@ -9110,7 +9197,7 @@
             <a:pPr rtl="0"/>
             <a:fld id="{415EA518-E098-4533-A7FE-3A70CD273BA1}" type="datetime1">
               <a:rPr lang="it-IT" noProof="0" smtClean="0"/>
-              <a:t>30/10/2022</a:t>
+              <a:t>06/11/2022</a:t>
             </a:fld>
             <a:endParaRPr lang="it-IT" noProof="0" dirty="0"/>
           </a:p>
@@ -10097,7 +10184,7 @@
                   </a:schemeClr>
                 </a:solidFill>
               </a:rPr>
-              <a:t>Tool GCODE</a:t>
+              <a:t>Interfaccia del GCODE: traduzione informale</a:t>
             </a:r>
           </a:p>
         </p:txBody>
@@ -10229,74 +10316,24 @@
         </p:nvSpPr>
         <p:spPr>
           <a:xfrm>
-            <a:off x="590926" y="1452870"/>
-            <a:ext cx="11010147" cy="4590875"/>
+            <a:off x="590925" y="1452870"/>
+            <a:ext cx="10864473" cy="805314"/>
           </a:xfrm>
         </p:spPr>
         <p:txBody>
           <a:bodyPr vert="horz" lIns="0" tIns="45720" rIns="0" bIns="45720" rtlCol="0">
-            <a:normAutofit/>
+            <a:normAutofit lnSpcReduction="10000"/>
           </a:bodyPr>
           <a:lstStyle/>
           <a:p>
-            <a:pPr rtl="0"/>
+            <a:pPr marL="0" indent="0">
+              <a:buNone/>
+            </a:pPr>
             <a:r>
               <a:rPr lang="it-IT" dirty="0">
                 <a:latin typeface="+mj-lt"/>
               </a:rPr>
-              <a:t>Il codice e la grammatica, cosi come una release Java compilata sono disponibili su GitHub alla repository -&gt; </a:t>
-            </a:r>
-            <a:r>
-              <a:rPr lang="it-IT" dirty="0">
-                <a:latin typeface="+mj-lt"/>
-                <a:hlinkClick r:id="rId3"/>
-              </a:rPr>
-              <a:t>https://github.com/fabiogamba98/GCODE</a:t>
-            </a:r>
-            <a:endParaRPr lang="it-IT" dirty="0">
-              <a:latin typeface="+mj-lt"/>
-            </a:endParaRPr>
-          </a:p>
-          <a:p>
-            <a:pPr rtl="0"/>
-            <a:r>
-              <a:rPr lang="it-IT" dirty="0">
-                <a:latin typeface="+mj-lt"/>
-              </a:rPr>
-              <a:t>Per l’esecuzione del tool è necessario installare il pacchetto Java Runtime Environment (oppure Java JDK che contiene strumenti aggiuntivi per lo sviluppo)</a:t>
-            </a:r>
-          </a:p>
-          <a:p>
-            <a:pPr rtl="0"/>
-            <a:r>
-              <a:rPr lang="it-IT" dirty="0">
-                <a:latin typeface="+mj-lt"/>
-              </a:rPr>
-              <a:t>Le tecnologie e gli strumenti utilizzati per lo sviluppo sono stati Java utilizzando Eclipse come IDE, Java Swing per l’interfaccia, </a:t>
-            </a:r>
-            <a:r>
-              <a:rPr lang="it-IT" dirty="0" err="1">
-                <a:latin typeface="+mj-lt"/>
-              </a:rPr>
-              <a:t>AntLR</a:t>
-            </a:r>
-            <a:r>
-              <a:rPr lang="it-IT" dirty="0">
-                <a:latin typeface="+mj-lt"/>
-              </a:rPr>
-              <a:t> 3.4, </a:t>
-            </a:r>
-            <a:r>
-              <a:rPr lang="it-IT" dirty="0" err="1">
-                <a:latin typeface="+mj-lt"/>
-              </a:rPr>
-              <a:t>AntLRworks</a:t>
-            </a:r>
-            <a:r>
-              <a:rPr lang="it-IT" dirty="0">
-                <a:latin typeface="+mj-lt"/>
-              </a:rPr>
-              <a:t> 1.5.2 per la grammatica</a:t>
+              <a:t>Successivamente verrà mostrata una traduzione dei movimenti contenuti nel programma e della configurazione d’uscita</a:t>
             </a:r>
           </a:p>
         </p:txBody>
@@ -10316,13 +10353,13 @@
           <p:nvPr/>
         </p:nvPicPr>
         <p:blipFill>
-          <a:blip r:embed="rId4" cstate="print">
+          <a:blip r:embed="rId3" cstate="print">
             <a:extLst>
               <a:ext uri="{28A0092B-C50C-407E-A947-70E740481C1C}">
                 <a14:useLocalDpi xmlns:a14="http://schemas.microsoft.com/office/drawing/2010/main" val="0"/>
               </a:ext>
               <a:ext uri="{96DAC541-7B7A-43D3-8B79-37D633B846F1}">
-                <asvg:svgBlip xmlns:asvg="http://schemas.microsoft.com/office/drawing/2016/SVG/main" r:embed="rId5"/>
+                <asvg:svgBlip xmlns:asvg="http://schemas.microsoft.com/office/drawing/2016/SVG/main" r:embed="rId4"/>
               </a:ext>
             </a:extLst>
           </a:blip>
@@ -10391,10 +10428,307 @@
           </a:p>
         </p:txBody>
       </p:sp>
+      <p:pic>
+        <p:nvPicPr>
+          <p:cNvPr id="3" name="Immagine 2">
+            <a:extLst>
+              <a:ext uri="{FF2B5EF4-FFF2-40B4-BE49-F238E27FC236}">
+                <a16:creationId xmlns:a16="http://schemas.microsoft.com/office/drawing/2014/main" id="{3E564E1D-05D0-836B-6FAB-84B43FA59577}"/>
+              </a:ext>
+            </a:extLst>
+          </p:cNvPr>
+          <p:cNvPicPr>
+            <a:picLocks noChangeAspect="1"/>
+          </p:cNvPicPr>
+          <p:nvPr/>
+        </p:nvPicPr>
+        <p:blipFill>
+          <a:blip r:embed="rId5"/>
+          <a:stretch>
+            <a:fillRect/>
+          </a:stretch>
+        </p:blipFill>
+        <p:spPr>
+          <a:xfrm>
+            <a:off x="2174176" y="2385184"/>
+            <a:ext cx="8005671" cy="3349039"/>
+          </a:xfrm>
+          <a:prstGeom prst="rect">
+            <a:avLst/>
+          </a:prstGeom>
+          <a:ln>
+            <a:solidFill>
+              <a:schemeClr val="tx1"/>
+            </a:solidFill>
+          </a:ln>
+        </p:spPr>
+      </p:pic>
     </p:spTree>
     <p:extLst>
       <p:ext uri="{BB962C8B-B14F-4D97-AF65-F5344CB8AC3E}">
-        <p14:creationId xmlns:p14="http://schemas.microsoft.com/office/powerpoint/2010/main" val="3769931090"/>
+        <p14:creationId xmlns:p14="http://schemas.microsoft.com/office/powerpoint/2010/main" val="1635297585"/>
+      </p:ext>
+    </p:extLst>
+  </p:cSld>
+  <p:clrMapOvr>
+    <a:masterClrMapping/>
+  </p:clrMapOvr>
+</p:sld>
+</file>
+
+<file path=ppt/slides/slide11.xml><?xml version="1.0" encoding="utf-8"?>
+<p:sld xmlns:a="http://schemas.openxmlformats.org/drawingml/2006/main" xmlns:r="http://schemas.openxmlformats.org/officeDocument/2006/relationships" xmlns:p="http://schemas.openxmlformats.org/presentationml/2006/main">
+  <p:cSld>
+    <p:bg>
+      <p:bgPr>
+        <a:solidFill>
+          <a:schemeClr val="bg1"/>
+        </a:solidFill>
+        <a:effectLst/>
+      </p:bgPr>
+    </p:bg>
+    <p:spTree>
+      <p:nvGrpSpPr>
+        <p:cNvPr id="1" name=""/>
+        <p:cNvGrpSpPr/>
+        <p:nvPr/>
+      </p:nvGrpSpPr>
+      <p:grpSpPr>
+        <a:xfrm>
+          <a:off x="0" y="0"/>
+          <a:ext cx="0" cy="0"/>
+          <a:chOff x="0" y="0"/>
+          <a:chExt cx="0" cy="0"/>
+        </a:xfrm>
+      </p:grpSpPr>
+      <p:sp>
+        <p:nvSpPr>
+          <p:cNvPr id="6" name="Titolo 5">
+            <a:extLst>
+              <a:ext uri="{FF2B5EF4-FFF2-40B4-BE49-F238E27FC236}">
+                <a16:creationId xmlns:a16="http://schemas.microsoft.com/office/drawing/2014/main" id="{CE09A200-4838-4284-BD1E-19701CABB5FE}"/>
+              </a:ext>
+            </a:extLst>
+          </p:cNvPr>
+          <p:cNvSpPr>
+            <a:spLocks noGrp="1"/>
+          </p:cNvSpPr>
+          <p:nvPr>
+            <p:ph type="title"/>
+          </p:nvPr>
+        </p:nvSpPr>
+        <p:spPr>
+          <a:xfrm>
+            <a:off x="1097280" y="286603"/>
+            <a:ext cx="10058400" cy="1450757"/>
+          </a:xfrm>
+        </p:spPr>
+        <p:txBody>
+          <a:bodyPr rtlCol="0">
+            <a:normAutofit/>
+          </a:bodyPr>
+          <a:lstStyle/>
+          <a:p>
+            <a:pPr rtl="0"/>
+            <a:r>
+              <a:rPr lang="it-IT" sz="4800" dirty="0">
+                <a:solidFill>
+                  <a:schemeClr val="tx1">
+                    <a:lumMod val="75000"/>
+                    <a:lumOff val="25000"/>
+                  </a:schemeClr>
+                </a:solidFill>
+              </a:rPr>
+              <a:t>Tecnologie utilizzate</a:t>
+            </a:r>
+            <a:endParaRPr lang="it-IT" dirty="0"/>
+          </a:p>
+        </p:txBody>
+      </p:sp>
+      <p:pic>
+        <p:nvPicPr>
+          <p:cNvPr id="4" name="Elemento grafico 3">
+            <a:extLst>
+              <a:ext uri="{FF2B5EF4-FFF2-40B4-BE49-F238E27FC236}">
+                <a16:creationId xmlns:a16="http://schemas.microsoft.com/office/drawing/2014/main" id="{ED0A95A1-BC85-4809-B935-6A9B3C054422}"/>
+              </a:ext>
+            </a:extLst>
+          </p:cNvPr>
+          <p:cNvPicPr>
+            <a:picLocks noChangeAspect="1"/>
+          </p:cNvPicPr>
+          <p:nvPr/>
+        </p:nvPicPr>
+        <p:blipFill>
+          <a:blip r:embed="rId3" cstate="print">
+            <a:extLst>
+              <a:ext uri="{28A0092B-C50C-407E-A947-70E740481C1C}">
+                <a14:useLocalDpi xmlns:a14="http://schemas.microsoft.com/office/drawing/2010/main" val="0"/>
+              </a:ext>
+              <a:ext uri="{96DAC541-7B7A-43D3-8B79-37D633B846F1}">
+                <asvg:svgBlip xmlns:asvg="http://schemas.microsoft.com/office/drawing/2016/SVG/main" r:embed="rId4"/>
+              </a:ext>
+            </a:extLst>
+          </a:blip>
+          <a:stretch>
+            <a:fillRect/>
+          </a:stretch>
+        </p:blipFill>
+        <p:spPr>
+          <a:xfrm>
+            <a:off x="207095" y="6043750"/>
+            <a:ext cx="1770209" cy="700341"/>
+          </a:xfrm>
+          <a:prstGeom prst="rect">
+            <a:avLst/>
+          </a:prstGeom>
+        </p:spPr>
+      </p:pic>
+      <p:sp>
+        <p:nvSpPr>
+          <p:cNvPr id="10" name="Connettore 9">
+            <a:extLst>
+              <a:ext uri="{FF2B5EF4-FFF2-40B4-BE49-F238E27FC236}">
+                <a16:creationId xmlns:a16="http://schemas.microsoft.com/office/drawing/2014/main" id="{7DA3C5E2-1B7C-406E-9A80-B7F344044586}"/>
+              </a:ext>
+            </a:extLst>
+          </p:cNvPr>
+          <p:cNvSpPr/>
+          <p:nvPr/>
+        </p:nvSpPr>
+        <p:spPr>
+          <a:xfrm>
+            <a:off x="11455401" y="6273800"/>
+            <a:ext cx="512910" cy="470291"/>
+          </a:xfrm>
+          <a:prstGeom prst="flowChartConnector">
+            <a:avLst/>
+          </a:prstGeom>
+        </p:spPr>
+        <p:style>
+          <a:lnRef idx="2">
+            <a:schemeClr val="accent1">
+              <a:shade val="50000"/>
+            </a:schemeClr>
+          </a:lnRef>
+          <a:fillRef idx="1">
+            <a:schemeClr val="accent1"/>
+          </a:fillRef>
+          <a:effectRef idx="0">
+            <a:schemeClr val="accent1"/>
+          </a:effectRef>
+          <a:fontRef idx="minor">
+            <a:schemeClr val="lt1"/>
+          </a:fontRef>
+        </p:style>
+        <p:txBody>
+          <a:bodyPr rtlCol="0" anchor="ctr"/>
+          <a:lstStyle/>
+          <a:p>
+            <a:pPr algn="ctr"/>
+            <a:fld id="{3A98EE3D-8CD1-4C3F-BD1C-C98C9596463C}" type="slidenum">
+              <a:rPr lang="it-IT" sz="1200" b="1"/>
+              <a:pPr algn="ctr"/>
+              <a:t>11</a:t>
+            </a:fld>
+            <a:endParaRPr lang="it-IT" b="1" dirty="0"/>
+          </a:p>
+        </p:txBody>
+      </p:sp>
+      <p:sp>
+        <p:nvSpPr>
+          <p:cNvPr id="3" name="Segnaposto contenuto 2">
+            <a:extLst>
+              <a:ext uri="{FF2B5EF4-FFF2-40B4-BE49-F238E27FC236}">
+                <a16:creationId xmlns:a16="http://schemas.microsoft.com/office/drawing/2014/main" id="{CDBDD0AC-B78E-4283-B5F3-A381229EABF5}"/>
+              </a:ext>
+            </a:extLst>
+          </p:cNvPr>
+          <p:cNvSpPr>
+            <a:spLocks noGrp="1"/>
+          </p:cNvSpPr>
+          <p:nvPr>
+            <p:ph idx="1"/>
+          </p:nvPr>
+        </p:nvSpPr>
+        <p:spPr>
+          <a:xfrm>
+            <a:off x="1216547" y="2108201"/>
+            <a:ext cx="10238854" cy="3760891"/>
+          </a:xfrm>
+        </p:spPr>
+        <p:txBody>
+          <a:bodyPr>
+            <a:noAutofit/>
+          </a:bodyPr>
+          <a:lstStyle/>
+          <a:p>
+            <a:pPr rtl="0"/>
+            <a:r>
+              <a:rPr lang="it-IT" sz="2400" dirty="0">
+                <a:latin typeface="+mj-lt"/>
+              </a:rPr>
+              <a:t>Il codice e la grammatica, cosi come una release Java compilata sono disponibili su GitHub alla repository -&gt; </a:t>
+            </a:r>
+            <a:r>
+              <a:rPr lang="it-IT" sz="2400" dirty="0">
+                <a:latin typeface="+mj-lt"/>
+                <a:hlinkClick r:id="rId5"/>
+              </a:rPr>
+              <a:t>https://github.com/fabiogamba98/GCODE</a:t>
+            </a:r>
+            <a:endParaRPr lang="it-IT" sz="2400" dirty="0">
+              <a:latin typeface="+mj-lt"/>
+            </a:endParaRPr>
+          </a:p>
+          <a:p>
+            <a:pPr rtl="0"/>
+            <a:r>
+              <a:rPr lang="it-IT" sz="2400" dirty="0">
+                <a:latin typeface="+mj-lt"/>
+              </a:rPr>
+              <a:t>Per l’esecuzione del tool è necessario installare il pacchetto Java Runtime Environment (oppure Java JDK che contiene strumenti aggiuntivi per lo sviluppo)</a:t>
+            </a:r>
+          </a:p>
+          <a:p>
+            <a:pPr rtl="0"/>
+            <a:r>
+              <a:rPr lang="it-IT" sz="2400" dirty="0">
+                <a:latin typeface="+mj-lt"/>
+              </a:rPr>
+              <a:t>Le tecnologie e gli strumenti utilizzati per lo sviluppo sono stati Java utilizzando Eclipse come IDE, Java Swing per l’interfaccia, </a:t>
+            </a:r>
+            <a:r>
+              <a:rPr lang="it-IT" sz="2400" dirty="0" err="1">
+                <a:latin typeface="+mj-lt"/>
+              </a:rPr>
+              <a:t>AntLR</a:t>
+            </a:r>
+            <a:r>
+              <a:rPr lang="it-IT" sz="2400" dirty="0">
+                <a:latin typeface="+mj-lt"/>
+              </a:rPr>
+              <a:t> 3.4, </a:t>
+            </a:r>
+            <a:r>
+              <a:rPr lang="it-IT" sz="2400" dirty="0" err="1">
+                <a:latin typeface="+mj-lt"/>
+              </a:rPr>
+              <a:t>AntLRworks</a:t>
+            </a:r>
+            <a:r>
+              <a:rPr lang="it-IT" sz="2400" dirty="0">
+                <a:latin typeface="+mj-lt"/>
+              </a:rPr>
+              <a:t> 1.5.2 per la grammatica</a:t>
+            </a:r>
+          </a:p>
+        </p:txBody>
+      </p:sp>
+    </p:spTree>
+    <p:extLst>
+      <p:ext uri="{BB962C8B-B14F-4D97-AF65-F5344CB8AC3E}">
+        <p14:creationId xmlns:p14="http://schemas.microsoft.com/office/powerpoint/2010/main" val="1318820384"/>
       </p:ext>
     </p:extLst>
   </p:cSld>
@@ -11432,6 +11766,11 @@
           <a:prstGeom prst="rect">
             <a:avLst/>
           </a:prstGeom>
+          <a:ln>
+            <a:solidFill>
+              <a:schemeClr val="tx1"/>
+            </a:solidFill>
+          </a:ln>
         </p:spPr>
       </p:pic>
       <p:pic>
@@ -11468,6 +11807,11 @@
           <a:prstGeom prst="rect">
             <a:avLst/>
           </a:prstGeom>
+          <a:ln>
+            <a:solidFill>
+              <a:schemeClr val="tx1"/>
+            </a:solidFill>
+          </a:ln>
         </p:spPr>
       </p:pic>
     </p:spTree>
@@ -11716,7 +12060,7 @@
                   </a:schemeClr>
                 </a:solidFill>
               </a:rPr>
-              <a:t>Istruzioni del GCODE</a:t>
+              <a:t>Alcune istruzioni tipiche</a:t>
             </a:r>
           </a:p>
         </p:txBody>
@@ -13075,6 +13419,11 @@
           <a:prstGeom prst="rect">
             <a:avLst/>
           </a:prstGeom>
+          <a:ln>
+            <a:solidFill>
+              <a:schemeClr val="tx1"/>
+            </a:solidFill>
+          </a:ln>
         </p:spPr>
       </p:pic>
       <p:sp>
@@ -13408,41 +13757,99 @@
       </p:grpSpPr>
       <p:sp>
         <p:nvSpPr>
-          <p:cNvPr id="26" name="Rettangolo 28">
-            <a:extLst>
-              <a:ext uri="{FF2B5EF4-FFF2-40B4-BE49-F238E27FC236}">
-                <a16:creationId xmlns:a16="http://schemas.microsoft.com/office/drawing/2014/main" id="{416A0E3C-60E6-4F39-BC55-5F7C224E1F7C}"/>
-              </a:ext>
-              <a:ext uri="{C183D7F6-B498-43B3-948B-1728B52AA6E4}">
-                <adec:decorative xmlns:adec="http://schemas.microsoft.com/office/drawing/2017/decorative" val="1"/>
-              </a:ext>
-            </a:extLst>
-          </p:cNvPr>
-          <p:cNvSpPr>
-            <a:spLocks noGrp="1" noRot="1" noChangeAspect="1" noMove="1" noResize="1" noEditPoints="1" noAdjustHandles="1" noChangeArrowheads="1" noChangeShapeType="1" noTextEdit="1"/>
-          </p:cNvSpPr>
-          <p:nvPr>
-            <p:extLst>
-              <p:ext uri="{386F3935-93C4-4BCD-93E2-E3B085C9AB24}">
-                <p16:designElem xmlns:p16="http://schemas.microsoft.com/office/powerpoint/2015/main" val="1"/>
-              </p:ext>
-            </p:extLst>
-          </p:nvPr>
-        </p:nvSpPr>
-        <p:spPr>
-          <a:xfrm>
-            <a:off x="3175" y="6400800"/>
-            <a:ext cx="12188825" cy="457200"/>
+          <p:cNvPr id="6" name="Titolo 5">
+            <a:extLst>
+              <a:ext uri="{FF2B5EF4-FFF2-40B4-BE49-F238E27FC236}">
+                <a16:creationId xmlns:a16="http://schemas.microsoft.com/office/drawing/2014/main" id="{CE09A200-4838-4284-BD1E-19701CABB5FE}"/>
+              </a:ext>
+            </a:extLst>
+          </p:cNvPr>
+          <p:cNvSpPr>
+            <a:spLocks noGrp="1"/>
+          </p:cNvSpPr>
+          <p:nvPr>
+            <p:ph type="title"/>
+          </p:nvPr>
+        </p:nvSpPr>
+        <p:spPr>
+          <a:xfrm>
+            <a:off x="1097280" y="286603"/>
+            <a:ext cx="10058400" cy="1450757"/>
+          </a:xfrm>
+        </p:spPr>
+        <p:txBody>
+          <a:bodyPr rtlCol="0">
+            <a:normAutofit/>
+          </a:bodyPr>
+          <a:lstStyle/>
+          <a:p>
+            <a:pPr rtl="0"/>
+            <a:r>
+              <a:rPr lang="it-IT" dirty="0"/>
+              <a:t>Tool GCODE</a:t>
+            </a:r>
+          </a:p>
+        </p:txBody>
+      </p:sp>
+      <p:pic>
+        <p:nvPicPr>
+          <p:cNvPr id="4" name="Elemento grafico 3">
+            <a:extLst>
+              <a:ext uri="{FF2B5EF4-FFF2-40B4-BE49-F238E27FC236}">
+                <a16:creationId xmlns:a16="http://schemas.microsoft.com/office/drawing/2014/main" id="{ED0A95A1-BC85-4809-B935-6A9B3C054422}"/>
+              </a:ext>
+            </a:extLst>
+          </p:cNvPr>
+          <p:cNvPicPr>
+            <a:picLocks noChangeAspect="1"/>
+          </p:cNvPicPr>
+          <p:nvPr/>
+        </p:nvPicPr>
+        <p:blipFill>
+          <a:blip r:embed="rId3" cstate="print">
+            <a:extLst>
+              <a:ext uri="{28A0092B-C50C-407E-A947-70E740481C1C}">
+                <a14:useLocalDpi xmlns:a14="http://schemas.microsoft.com/office/drawing/2010/main" val="0"/>
+              </a:ext>
+              <a:ext uri="{96DAC541-7B7A-43D3-8B79-37D633B846F1}">
+                <asvg:svgBlip xmlns:asvg="http://schemas.microsoft.com/office/drawing/2016/SVG/main" r:embed="rId4"/>
+              </a:ext>
+            </a:extLst>
+          </a:blip>
+          <a:stretch>
+            <a:fillRect/>
+          </a:stretch>
+        </p:blipFill>
+        <p:spPr>
+          <a:xfrm>
+            <a:off x="207095" y="6043750"/>
+            <a:ext cx="1770209" cy="700341"/>
           </a:xfrm>
           <a:prstGeom prst="rect">
             <a:avLst/>
           </a:prstGeom>
-          <a:solidFill>
-            <a:srgbClr val="262626"/>
-          </a:solidFill>
-          <a:ln>
-            <a:noFill/>
-          </a:ln>
+        </p:spPr>
+      </p:pic>
+      <p:sp>
+        <p:nvSpPr>
+          <p:cNvPr id="10" name="Connettore 9">
+            <a:extLst>
+              <a:ext uri="{FF2B5EF4-FFF2-40B4-BE49-F238E27FC236}">
+                <a16:creationId xmlns:a16="http://schemas.microsoft.com/office/drawing/2014/main" id="{7DA3C5E2-1B7C-406E-9A80-B7F344044586}"/>
+              </a:ext>
+            </a:extLst>
+          </p:cNvPr>
+          <p:cNvSpPr/>
+          <p:nvPr/>
+        </p:nvSpPr>
+        <p:spPr>
+          <a:xfrm>
+            <a:off x="11455401" y="6273800"/>
+            <a:ext cx="512910" cy="470291"/>
+          </a:xfrm>
+          <a:prstGeom prst="flowChartConnector">
+            <a:avLst/>
+          </a:prstGeom>
         </p:spPr>
         <p:style>
           <a:lnRef idx="2">
@@ -13460,418 +13867,6 @@
             <a:schemeClr val="lt1"/>
           </a:fontRef>
         </p:style>
-      </p:sp>
-      <p:cxnSp>
-        <p:nvCxnSpPr>
-          <p:cNvPr id="27" name="Connettore diritto 30">
-            <a:extLst>
-              <a:ext uri="{FF2B5EF4-FFF2-40B4-BE49-F238E27FC236}">
-                <a16:creationId xmlns:a16="http://schemas.microsoft.com/office/drawing/2014/main" id="{C5025DAC-8B93-4160-B017-3A274A5828C0}"/>
-              </a:ext>
-              <a:ext uri="{C183D7F6-B498-43B3-948B-1728B52AA6E4}">
-                <adec:decorative xmlns:adec="http://schemas.microsoft.com/office/drawing/2017/decorative" val="1"/>
-              </a:ext>
-            </a:extLst>
-          </p:cNvPr>
-          <p:cNvCxnSpPr>
-            <a:cxnSpLocks noGrp="1" noRot="1" noChangeAspect="1" noMove="1" noResize="1" noEditPoints="1" noAdjustHandles="1" noChangeArrowheads="1" noChangeShapeType="1"/>
-          </p:cNvCxnSpPr>
-          <p:nvPr>
-            <p:extLst>
-              <p:ext uri="{386F3935-93C4-4BCD-93E2-E3B085C9AB24}">
-                <p16:designElem xmlns:p16="http://schemas.microsoft.com/office/powerpoint/2015/main" val="1"/>
-              </p:ext>
-            </p:extLst>
-          </p:nvPr>
-        </p:nvCxnSpPr>
-        <p:spPr>
-          <a:xfrm>
-            <a:off x="1193532" y="1897380"/>
-            <a:ext cx="9966960" cy="0"/>
-          </a:xfrm>
-          <a:prstGeom prst="line">
-            <a:avLst/>
-          </a:prstGeom>
-          <a:ln w="12700">
-            <a:solidFill>
-              <a:schemeClr val="tx1">
-                <a:lumMod val="75000"/>
-                <a:lumOff val="25000"/>
-              </a:schemeClr>
-            </a:solidFill>
-          </a:ln>
-        </p:spPr>
-        <p:style>
-          <a:lnRef idx="1">
-            <a:schemeClr val="accent1"/>
-          </a:lnRef>
-          <a:fillRef idx="0">
-            <a:schemeClr val="accent1"/>
-          </a:fillRef>
-          <a:effectRef idx="0">
-            <a:schemeClr val="accent1"/>
-          </a:effectRef>
-          <a:fontRef idx="minor">
-            <a:schemeClr val="tx1"/>
-          </a:fontRef>
-        </p:style>
-      </p:cxnSp>
-      <p:sp useBgFill="1">
-        <p:nvSpPr>
-          <p:cNvPr id="28" name="Rettangolo 32">
-            <a:extLst>
-              <a:ext uri="{FF2B5EF4-FFF2-40B4-BE49-F238E27FC236}">
-                <a16:creationId xmlns:a16="http://schemas.microsoft.com/office/drawing/2014/main" id="{990D0034-F768-41E7-85D4-F38C4DE85770}"/>
-              </a:ext>
-              <a:ext uri="{C183D7F6-B498-43B3-948B-1728B52AA6E4}">
-                <adec:decorative xmlns:adec="http://schemas.microsoft.com/office/drawing/2017/decorative" val="1"/>
-              </a:ext>
-            </a:extLst>
-          </p:cNvPr>
-          <p:cNvSpPr>
-            <a:spLocks noGrp="1" noRot="1" noChangeAspect="1" noMove="1" noResize="1" noEditPoints="1" noAdjustHandles="1" noChangeArrowheads="1" noChangeShapeType="1" noTextEdit="1"/>
-          </p:cNvSpPr>
-          <p:nvPr>
-            <p:extLst>
-              <p:ext uri="{386F3935-93C4-4BCD-93E2-E3B085C9AB24}">
-                <p16:designElem xmlns:p16="http://schemas.microsoft.com/office/powerpoint/2015/main" val="1"/>
-              </p:ext>
-            </p:extLst>
-          </p:nvPr>
-        </p:nvSpPr>
-        <p:spPr>
-          <a:xfrm>
-            <a:off x="0" y="0"/>
-            <a:ext cx="12186315" cy="6858000"/>
-          </a:xfrm>
-          <a:prstGeom prst="rect">
-            <a:avLst/>
-          </a:prstGeom>
-          <a:ln>
-            <a:noFill/>
-          </a:ln>
-        </p:spPr>
-        <p:style>
-          <a:lnRef idx="2">
-            <a:schemeClr val="accent6">
-              <a:shade val="50000"/>
-            </a:schemeClr>
-          </a:lnRef>
-          <a:fillRef idx="1001">
-            <a:schemeClr val="lt1"/>
-          </a:fillRef>
-          <a:effectRef idx="0">
-            <a:schemeClr val="accent6"/>
-          </a:effectRef>
-          <a:fontRef idx="minor">
-            <a:schemeClr val="lt1"/>
-          </a:fontRef>
-        </p:style>
-        <p:txBody>
-          <a:bodyPr rtlCol="0" anchor="ctr"/>
-          <a:lstStyle/>
-          <a:p>
-            <a:pPr algn="ctr" rtl="0"/>
-            <a:endParaRPr lang="it-IT" dirty="0"/>
-          </a:p>
-        </p:txBody>
-      </p:sp>
-      <p:sp>
-        <p:nvSpPr>
-          <p:cNvPr id="5" name="Titolo 4">
-            <a:extLst>
-              <a:ext uri="{FF2B5EF4-FFF2-40B4-BE49-F238E27FC236}">
-                <a16:creationId xmlns:a16="http://schemas.microsoft.com/office/drawing/2014/main" id="{B8B72B13-069B-4F8A-9437-FA58C3F1D44B}"/>
-              </a:ext>
-            </a:extLst>
-          </p:cNvPr>
-          <p:cNvSpPr>
-            <a:spLocks noGrp="1"/>
-          </p:cNvSpPr>
-          <p:nvPr>
-            <p:ph type="title"/>
-          </p:nvPr>
-        </p:nvSpPr>
-        <p:spPr>
-          <a:xfrm>
-            <a:off x="590927" y="535936"/>
-            <a:ext cx="10864474" cy="700340"/>
-          </a:xfrm>
-        </p:spPr>
-        <p:txBody>
-          <a:bodyPr vert="horz" lIns="91440" tIns="45720" rIns="91440" bIns="45720" rtlCol="0" anchor="b">
-            <a:noAutofit/>
-          </a:bodyPr>
-          <a:lstStyle/>
-          <a:p>
-            <a:pPr rtl="0"/>
-            <a:r>
-              <a:rPr lang="it-IT" sz="4400" dirty="0">
-                <a:solidFill>
-                  <a:schemeClr val="tx1">
-                    <a:lumMod val="75000"/>
-                    <a:lumOff val="25000"/>
-                  </a:schemeClr>
-                </a:solidFill>
-              </a:rPr>
-              <a:t>Tool GCODE</a:t>
-            </a:r>
-          </a:p>
-        </p:txBody>
-      </p:sp>
-      <p:cxnSp>
-        <p:nvCxnSpPr>
-          <p:cNvPr id="30" name="Connettore diritto 34">
-            <a:extLst>
-              <a:ext uri="{FF2B5EF4-FFF2-40B4-BE49-F238E27FC236}">
-                <a16:creationId xmlns:a16="http://schemas.microsoft.com/office/drawing/2014/main" id="{5A0A5CF6-407C-4691-8122-49DF69D0020D}"/>
-              </a:ext>
-              <a:ext uri="{C183D7F6-B498-43B3-948B-1728B52AA6E4}">
-                <adec:decorative xmlns:adec="http://schemas.microsoft.com/office/drawing/2017/decorative" val="1"/>
-              </a:ext>
-            </a:extLst>
-          </p:cNvPr>
-          <p:cNvCxnSpPr>
-            <a:cxnSpLocks noGrp="1" noRot="1" noChangeAspect="1" noMove="1" noResize="1" noEditPoints="1" noAdjustHandles="1" noChangeArrowheads="1" noChangeShapeType="1"/>
-          </p:cNvCxnSpPr>
-          <p:nvPr>
-            <p:extLst>
-              <p:ext uri="{386F3935-93C4-4BCD-93E2-E3B085C9AB24}">
-                <p16:designElem xmlns:p16="http://schemas.microsoft.com/office/powerpoint/2015/main" val="1"/>
-              </p:ext>
-            </p:extLst>
-          </p:nvPr>
-        </p:nvCxnSpPr>
-        <p:spPr>
-          <a:xfrm>
-            <a:off x="590927" y="2633962"/>
-            <a:ext cx="2834640" cy="0"/>
-          </a:xfrm>
-          <a:prstGeom prst="line">
-            <a:avLst/>
-          </a:prstGeom>
-          <a:ln w="12700">
-            <a:solidFill>
-              <a:schemeClr val="tx1">
-                <a:lumMod val="75000"/>
-                <a:lumOff val="25000"/>
-              </a:schemeClr>
-            </a:solidFill>
-          </a:ln>
-        </p:spPr>
-        <p:style>
-          <a:lnRef idx="1">
-            <a:schemeClr val="accent1"/>
-          </a:lnRef>
-          <a:fillRef idx="0">
-            <a:schemeClr val="accent1"/>
-          </a:fillRef>
-          <a:effectRef idx="0">
-            <a:schemeClr val="accent1"/>
-          </a:effectRef>
-          <a:fontRef idx="minor">
-            <a:schemeClr val="tx1"/>
-          </a:fontRef>
-        </p:style>
-      </p:cxnSp>
-      <p:sp>
-        <p:nvSpPr>
-          <p:cNvPr id="4" name="Rettangolo 3">
-            <a:extLst>
-              <a:ext uri="{FF2B5EF4-FFF2-40B4-BE49-F238E27FC236}">
-                <a16:creationId xmlns:a16="http://schemas.microsoft.com/office/drawing/2014/main" id="{D22E5227-66DC-4545-A93A-3BAE57987144}"/>
-              </a:ext>
-            </a:extLst>
-          </p:cNvPr>
-          <p:cNvSpPr/>
-          <p:nvPr/>
-        </p:nvSpPr>
-        <p:spPr>
-          <a:xfrm>
-            <a:off x="590927" y="2477070"/>
-            <a:ext cx="2955837" cy="457195"/>
-          </a:xfrm>
-          <a:prstGeom prst="rect">
-            <a:avLst/>
-          </a:prstGeom>
-          <a:solidFill>
-            <a:schemeClr val="bg1"/>
-          </a:solidFill>
-          <a:ln>
-            <a:solidFill>
-              <a:schemeClr val="bg1"/>
-            </a:solidFill>
-          </a:ln>
-        </p:spPr>
-        <p:style>
-          <a:lnRef idx="2">
-            <a:schemeClr val="accent1">
-              <a:shade val="50000"/>
-            </a:schemeClr>
-          </a:lnRef>
-          <a:fillRef idx="1">
-            <a:schemeClr val="accent1"/>
-          </a:fillRef>
-          <a:effectRef idx="0">
-            <a:schemeClr val="accent1"/>
-          </a:effectRef>
-          <a:fontRef idx="minor">
-            <a:schemeClr val="lt1"/>
-          </a:fontRef>
-        </p:style>
-        <p:txBody>
-          <a:bodyPr rtlCol="0" anchor="ctr"/>
-          <a:lstStyle/>
-          <a:p>
-            <a:pPr algn="ctr"/>
-            <a:endParaRPr lang="it-IT"/>
-          </a:p>
-        </p:txBody>
-      </p:sp>
-      <p:sp>
-        <p:nvSpPr>
-          <p:cNvPr id="6" name="Segnaposto contenuto 5">
-            <a:extLst>
-              <a:ext uri="{FF2B5EF4-FFF2-40B4-BE49-F238E27FC236}">
-                <a16:creationId xmlns:a16="http://schemas.microsoft.com/office/drawing/2014/main" id="{2281D70C-EE29-493E-838C-890184A02C07}"/>
-              </a:ext>
-            </a:extLst>
-          </p:cNvPr>
-          <p:cNvSpPr>
-            <a:spLocks noGrp="1"/>
-          </p:cNvSpPr>
-          <p:nvPr>
-            <p:ph idx="1"/>
-          </p:nvPr>
-        </p:nvSpPr>
-        <p:spPr>
-          <a:xfrm>
-            <a:off x="590926" y="1452870"/>
-            <a:ext cx="4792826" cy="4590875"/>
-          </a:xfrm>
-        </p:spPr>
-        <p:txBody>
-          <a:bodyPr vert="horz" lIns="0" tIns="45720" rIns="0" bIns="45720" rtlCol="0">
-            <a:normAutofit/>
-          </a:bodyPr>
-          <a:lstStyle/>
-          <a:p>
-            <a:pPr rtl="0"/>
-            <a:r>
-              <a:rPr lang="it-IT" sz="2800" dirty="0">
-                <a:latin typeface="+mj-lt"/>
-              </a:rPr>
-              <a:t>Il tool GCODE si occupa del riconoscimento di questi programmi scritti per le macchine CNC</a:t>
-            </a:r>
-          </a:p>
-          <a:p>
-            <a:pPr rtl="0"/>
-            <a:r>
-              <a:rPr lang="it-IT" sz="2800" dirty="0">
-                <a:latin typeface="+mj-lt"/>
-              </a:rPr>
-              <a:t>Ne riporta una traduzione informale in italiano di ogni istruzione presente</a:t>
-            </a:r>
-          </a:p>
-          <a:p>
-            <a:pPr rtl="0"/>
-            <a:r>
-              <a:rPr lang="it-IT" sz="2800" dirty="0">
-                <a:latin typeface="+mj-lt"/>
-              </a:rPr>
-              <a:t>Oltre a un disegno del percorso seguito dalla macchina utensile</a:t>
-            </a:r>
-          </a:p>
-          <a:p>
-            <a:pPr rtl="0"/>
-            <a:endParaRPr lang="it-IT" dirty="0">
-              <a:latin typeface="+mj-lt"/>
-            </a:endParaRPr>
-          </a:p>
-          <a:p>
-            <a:pPr rtl="0"/>
-            <a:endParaRPr lang="it-IT" dirty="0">
-              <a:latin typeface="+mj-lt"/>
-            </a:endParaRPr>
-          </a:p>
-        </p:txBody>
-      </p:sp>
-      <p:pic>
-        <p:nvPicPr>
-          <p:cNvPr id="10" name="Elemento grafico 9">
-            <a:extLst>
-              <a:ext uri="{FF2B5EF4-FFF2-40B4-BE49-F238E27FC236}">
-                <a16:creationId xmlns:a16="http://schemas.microsoft.com/office/drawing/2014/main" id="{54A47743-7725-4A33-93CA-EFB89C10D1EC}"/>
-              </a:ext>
-            </a:extLst>
-          </p:cNvPr>
-          <p:cNvPicPr>
-            <a:picLocks noChangeAspect="1"/>
-          </p:cNvPicPr>
-          <p:nvPr/>
-        </p:nvPicPr>
-        <p:blipFill>
-          <a:blip r:embed="rId3" cstate="print">
-            <a:extLst>
-              <a:ext uri="{28A0092B-C50C-407E-A947-70E740481C1C}">
-                <a14:useLocalDpi xmlns:a14="http://schemas.microsoft.com/office/drawing/2010/main" val="0"/>
-              </a:ext>
-              <a:ext uri="{96DAC541-7B7A-43D3-8B79-37D633B846F1}">
-                <asvg:svgBlip xmlns:asvg="http://schemas.microsoft.com/office/drawing/2016/SVG/main" r:embed="rId4"/>
-              </a:ext>
-            </a:extLst>
-          </a:blip>
-          <a:stretch>
-            <a:fillRect/>
-          </a:stretch>
-        </p:blipFill>
-        <p:spPr>
-          <a:xfrm>
-            <a:off x="207095" y="6043750"/>
-            <a:ext cx="1770209" cy="700341"/>
-          </a:xfrm>
-          <a:prstGeom prst="rect">
-            <a:avLst/>
-          </a:prstGeom>
-        </p:spPr>
-      </p:pic>
-      <p:sp>
-        <p:nvSpPr>
-          <p:cNvPr id="12" name="Connettore 11">
-            <a:extLst>
-              <a:ext uri="{FF2B5EF4-FFF2-40B4-BE49-F238E27FC236}">
-                <a16:creationId xmlns:a16="http://schemas.microsoft.com/office/drawing/2014/main" id="{92095D8C-8CCA-4CC6-B2D2-E1BC4732F321}"/>
-              </a:ext>
-            </a:extLst>
-          </p:cNvPr>
-          <p:cNvSpPr/>
-          <p:nvPr/>
-        </p:nvSpPr>
-        <p:spPr>
-          <a:xfrm>
-            <a:off x="11455401" y="6273800"/>
-            <a:ext cx="512910" cy="470291"/>
-          </a:xfrm>
-          <a:prstGeom prst="flowChartConnector">
-            <a:avLst/>
-          </a:prstGeom>
-        </p:spPr>
-        <p:style>
-          <a:lnRef idx="2">
-            <a:schemeClr val="accent1">
-              <a:shade val="50000"/>
-            </a:schemeClr>
-          </a:lnRef>
-          <a:fillRef idx="1">
-            <a:schemeClr val="accent1"/>
-          </a:fillRef>
-          <a:effectRef idx="0">
-            <a:schemeClr val="accent1"/>
-          </a:effectRef>
-          <a:fontRef idx="minor">
-            <a:schemeClr val="lt1"/>
-          </a:fontRef>
-        </p:style>
         <p:txBody>
           <a:bodyPr rtlCol="0" anchor="ctr"/>
           <a:lstStyle/>
@@ -13886,12 +13881,68 @@
           </a:p>
         </p:txBody>
       </p:sp>
+      <p:sp>
+        <p:nvSpPr>
+          <p:cNvPr id="3" name="Segnaposto contenuto 2">
+            <a:extLst>
+              <a:ext uri="{FF2B5EF4-FFF2-40B4-BE49-F238E27FC236}">
+                <a16:creationId xmlns:a16="http://schemas.microsoft.com/office/drawing/2014/main" id="{CDBDD0AC-B78E-4283-B5F3-A381229EABF5}"/>
+              </a:ext>
+            </a:extLst>
+          </p:cNvPr>
+          <p:cNvSpPr>
+            <a:spLocks noGrp="1"/>
+          </p:cNvSpPr>
+          <p:nvPr>
+            <p:ph idx="1"/>
+          </p:nvPr>
+        </p:nvSpPr>
+        <p:spPr>
+          <a:xfrm>
+            <a:off x="1216548" y="2108201"/>
+            <a:ext cx="4205684" cy="3760891"/>
+          </a:xfrm>
+        </p:spPr>
+        <p:txBody>
+          <a:bodyPr>
+            <a:normAutofit/>
+          </a:bodyPr>
+          <a:lstStyle/>
+          <a:p>
+            <a:pPr rtl="0"/>
+            <a:r>
+              <a:rPr lang="it-IT" sz="2400" dirty="0">
+                <a:latin typeface="+mj-lt"/>
+              </a:rPr>
+              <a:t>Il tool GCODE si occupa del riconoscimento di questi programmi scritti per le macchine CNC</a:t>
+            </a:r>
+          </a:p>
+          <a:p>
+            <a:pPr rtl="0"/>
+            <a:r>
+              <a:rPr lang="it-IT" sz="2400" dirty="0">
+                <a:latin typeface="+mj-lt"/>
+              </a:rPr>
+              <a:t>Ne riporta una traduzione informale in italiano di ogni istruzione presente</a:t>
+            </a:r>
+          </a:p>
+          <a:p>
+            <a:pPr rtl="0"/>
+            <a:r>
+              <a:rPr lang="it-IT" sz="2400" dirty="0">
+                <a:latin typeface="+mj-lt"/>
+              </a:rPr>
+              <a:t>Oltre a un disegno del percorso seguito dalla macchina utensile</a:t>
+            </a:r>
+          </a:p>
+        </p:txBody>
+      </p:sp>
       <p:pic>
         <p:nvPicPr>
-          <p:cNvPr id="7" name="Immagine 6">
-            <a:extLst>
-              <a:ext uri="{FF2B5EF4-FFF2-40B4-BE49-F238E27FC236}">
-                <a16:creationId xmlns:a16="http://schemas.microsoft.com/office/drawing/2014/main" id="{CAF6870C-48F8-7F55-D652-8C561D461AB3}"/>
+          <p:cNvPr id="2" name="Immagine 1">
+            <a:extLst>
+              <a:ext uri="{FF2B5EF4-FFF2-40B4-BE49-F238E27FC236}">
+                <a16:creationId xmlns:a16="http://schemas.microsoft.com/office/drawing/2014/main" id="{DDA3B1E0-6844-6766-3DC3-CB54430922B4}"/>
               </a:ext>
             </a:extLst>
           </p:cNvPr>
@@ -13908,18 +13959,23 @@
         </p:blipFill>
         <p:spPr>
           <a:xfrm>
-            <a:off x="5608273" y="1363276"/>
+            <a:off x="5864728" y="1903104"/>
             <a:ext cx="6103583" cy="3051792"/>
           </a:xfrm>
           <a:prstGeom prst="rect">
             <a:avLst/>
           </a:prstGeom>
+          <a:ln>
+            <a:solidFill>
+              <a:schemeClr val="tx1"/>
+            </a:solidFill>
+          </a:ln>
         </p:spPr>
       </p:pic>
     </p:spTree>
     <p:extLst>
       <p:ext uri="{BB962C8B-B14F-4D97-AF65-F5344CB8AC3E}">
-        <p14:creationId xmlns:p14="http://schemas.microsoft.com/office/powerpoint/2010/main" val="2101953272"/>
+        <p14:creationId xmlns:p14="http://schemas.microsoft.com/office/powerpoint/2010/main" val="1755518762"/>
       </p:ext>
     </p:extLst>
   </p:cSld>
@@ -13956,41 +14012,107 @@
       </p:grpSpPr>
       <p:sp>
         <p:nvSpPr>
-          <p:cNvPr id="26" name="Rettangolo 28">
-            <a:extLst>
-              <a:ext uri="{FF2B5EF4-FFF2-40B4-BE49-F238E27FC236}">
-                <a16:creationId xmlns:a16="http://schemas.microsoft.com/office/drawing/2014/main" id="{416A0E3C-60E6-4F39-BC55-5F7C224E1F7C}"/>
-              </a:ext>
-              <a:ext uri="{C183D7F6-B498-43B3-948B-1728B52AA6E4}">
-                <adec:decorative xmlns:adec="http://schemas.microsoft.com/office/drawing/2017/decorative" val="1"/>
-              </a:ext>
-            </a:extLst>
-          </p:cNvPr>
-          <p:cNvSpPr>
-            <a:spLocks noGrp="1" noRot="1" noChangeAspect="1" noMove="1" noResize="1" noEditPoints="1" noAdjustHandles="1" noChangeArrowheads="1" noChangeShapeType="1" noTextEdit="1"/>
-          </p:cNvSpPr>
-          <p:nvPr>
-            <p:extLst>
-              <p:ext uri="{386F3935-93C4-4BCD-93E2-E3B085C9AB24}">
-                <p16:designElem xmlns:p16="http://schemas.microsoft.com/office/powerpoint/2015/main" val="1"/>
-              </p:ext>
-            </p:extLst>
-          </p:nvPr>
-        </p:nvSpPr>
-        <p:spPr>
-          <a:xfrm>
-            <a:off x="3175" y="6400800"/>
-            <a:ext cx="12188825" cy="457200"/>
+          <p:cNvPr id="6" name="Titolo 5">
+            <a:extLst>
+              <a:ext uri="{FF2B5EF4-FFF2-40B4-BE49-F238E27FC236}">
+                <a16:creationId xmlns:a16="http://schemas.microsoft.com/office/drawing/2014/main" id="{CE09A200-4838-4284-BD1E-19701CABB5FE}"/>
+              </a:ext>
+            </a:extLst>
+          </p:cNvPr>
+          <p:cNvSpPr>
+            <a:spLocks noGrp="1"/>
+          </p:cNvSpPr>
+          <p:nvPr>
+            <p:ph type="title"/>
+          </p:nvPr>
+        </p:nvSpPr>
+        <p:spPr>
+          <a:xfrm>
+            <a:off x="1097280" y="286603"/>
+            <a:ext cx="10058400" cy="1450757"/>
+          </a:xfrm>
+        </p:spPr>
+        <p:txBody>
+          <a:bodyPr rtlCol="0">
+            <a:normAutofit/>
+          </a:bodyPr>
+          <a:lstStyle/>
+          <a:p>
+            <a:pPr rtl="0"/>
+            <a:r>
+              <a:rPr lang="it-IT" sz="4800" dirty="0">
+                <a:solidFill>
+                  <a:schemeClr val="tx1">
+                    <a:lumMod val="75000"/>
+                    <a:lumOff val="25000"/>
+                  </a:schemeClr>
+                </a:solidFill>
+              </a:rPr>
+              <a:t>Obiettivi e funzionalità del tool</a:t>
+            </a:r>
+            <a:endParaRPr lang="it-IT" dirty="0"/>
+          </a:p>
+        </p:txBody>
+      </p:sp>
+      <p:pic>
+        <p:nvPicPr>
+          <p:cNvPr id="4" name="Elemento grafico 3">
+            <a:extLst>
+              <a:ext uri="{FF2B5EF4-FFF2-40B4-BE49-F238E27FC236}">
+                <a16:creationId xmlns:a16="http://schemas.microsoft.com/office/drawing/2014/main" id="{ED0A95A1-BC85-4809-B935-6A9B3C054422}"/>
+              </a:ext>
+            </a:extLst>
+          </p:cNvPr>
+          <p:cNvPicPr>
+            <a:picLocks noChangeAspect="1"/>
+          </p:cNvPicPr>
+          <p:nvPr/>
+        </p:nvPicPr>
+        <p:blipFill>
+          <a:blip r:embed="rId3" cstate="print">
+            <a:extLst>
+              <a:ext uri="{28A0092B-C50C-407E-A947-70E740481C1C}">
+                <a14:useLocalDpi xmlns:a14="http://schemas.microsoft.com/office/drawing/2010/main" val="0"/>
+              </a:ext>
+              <a:ext uri="{96DAC541-7B7A-43D3-8B79-37D633B846F1}">
+                <asvg:svgBlip xmlns:asvg="http://schemas.microsoft.com/office/drawing/2016/SVG/main" r:embed="rId4"/>
+              </a:ext>
+            </a:extLst>
+          </a:blip>
+          <a:stretch>
+            <a:fillRect/>
+          </a:stretch>
+        </p:blipFill>
+        <p:spPr>
+          <a:xfrm>
+            <a:off x="207095" y="6043750"/>
+            <a:ext cx="1770209" cy="700341"/>
           </a:xfrm>
           <a:prstGeom prst="rect">
             <a:avLst/>
           </a:prstGeom>
-          <a:solidFill>
-            <a:srgbClr val="262626"/>
-          </a:solidFill>
-          <a:ln>
-            <a:noFill/>
-          </a:ln>
+        </p:spPr>
+      </p:pic>
+      <p:sp>
+        <p:nvSpPr>
+          <p:cNvPr id="10" name="Connettore 9">
+            <a:extLst>
+              <a:ext uri="{FF2B5EF4-FFF2-40B4-BE49-F238E27FC236}">
+                <a16:creationId xmlns:a16="http://schemas.microsoft.com/office/drawing/2014/main" id="{7DA3C5E2-1B7C-406E-9A80-B7F344044586}"/>
+              </a:ext>
+            </a:extLst>
+          </p:cNvPr>
+          <p:cNvSpPr/>
+          <p:nvPr/>
+        </p:nvSpPr>
+        <p:spPr>
+          <a:xfrm>
+            <a:off x="11455401" y="6273800"/>
+            <a:ext cx="512910" cy="470291"/>
+          </a:xfrm>
+          <a:prstGeom prst="flowChartConnector">
+            <a:avLst/>
+          </a:prstGeom>
         </p:spPr>
         <p:style>
           <a:lnRef idx="2">
@@ -14008,406 +14130,6 @@
             <a:schemeClr val="lt1"/>
           </a:fontRef>
         </p:style>
-      </p:sp>
-      <p:cxnSp>
-        <p:nvCxnSpPr>
-          <p:cNvPr id="27" name="Connettore diritto 30">
-            <a:extLst>
-              <a:ext uri="{FF2B5EF4-FFF2-40B4-BE49-F238E27FC236}">
-                <a16:creationId xmlns:a16="http://schemas.microsoft.com/office/drawing/2014/main" id="{C5025DAC-8B93-4160-B017-3A274A5828C0}"/>
-              </a:ext>
-              <a:ext uri="{C183D7F6-B498-43B3-948B-1728B52AA6E4}">
-                <adec:decorative xmlns:adec="http://schemas.microsoft.com/office/drawing/2017/decorative" val="1"/>
-              </a:ext>
-            </a:extLst>
-          </p:cNvPr>
-          <p:cNvCxnSpPr>
-            <a:cxnSpLocks noGrp="1" noRot="1" noChangeAspect="1" noMove="1" noResize="1" noEditPoints="1" noAdjustHandles="1" noChangeArrowheads="1" noChangeShapeType="1"/>
-          </p:cNvCxnSpPr>
-          <p:nvPr>
-            <p:extLst>
-              <p:ext uri="{386F3935-93C4-4BCD-93E2-E3B085C9AB24}">
-                <p16:designElem xmlns:p16="http://schemas.microsoft.com/office/powerpoint/2015/main" val="1"/>
-              </p:ext>
-            </p:extLst>
-          </p:nvPr>
-        </p:nvCxnSpPr>
-        <p:spPr>
-          <a:xfrm>
-            <a:off x="1193532" y="1897380"/>
-            <a:ext cx="9966960" cy="0"/>
-          </a:xfrm>
-          <a:prstGeom prst="line">
-            <a:avLst/>
-          </a:prstGeom>
-          <a:ln w="12700">
-            <a:solidFill>
-              <a:schemeClr val="tx1">
-                <a:lumMod val="75000"/>
-                <a:lumOff val="25000"/>
-              </a:schemeClr>
-            </a:solidFill>
-          </a:ln>
-        </p:spPr>
-        <p:style>
-          <a:lnRef idx="1">
-            <a:schemeClr val="accent1"/>
-          </a:lnRef>
-          <a:fillRef idx="0">
-            <a:schemeClr val="accent1"/>
-          </a:fillRef>
-          <a:effectRef idx="0">
-            <a:schemeClr val="accent1"/>
-          </a:effectRef>
-          <a:fontRef idx="minor">
-            <a:schemeClr val="tx1"/>
-          </a:fontRef>
-        </p:style>
-      </p:cxnSp>
-      <p:sp useBgFill="1">
-        <p:nvSpPr>
-          <p:cNvPr id="28" name="Rettangolo 32">
-            <a:extLst>
-              <a:ext uri="{FF2B5EF4-FFF2-40B4-BE49-F238E27FC236}">
-                <a16:creationId xmlns:a16="http://schemas.microsoft.com/office/drawing/2014/main" id="{990D0034-F768-41E7-85D4-F38C4DE85770}"/>
-              </a:ext>
-              <a:ext uri="{C183D7F6-B498-43B3-948B-1728B52AA6E4}">
-                <adec:decorative xmlns:adec="http://schemas.microsoft.com/office/drawing/2017/decorative" val="1"/>
-              </a:ext>
-            </a:extLst>
-          </p:cNvPr>
-          <p:cNvSpPr>
-            <a:spLocks noGrp="1" noRot="1" noChangeAspect="1" noMove="1" noResize="1" noEditPoints="1" noAdjustHandles="1" noChangeArrowheads="1" noChangeShapeType="1" noTextEdit="1"/>
-          </p:cNvSpPr>
-          <p:nvPr>
-            <p:extLst>
-              <p:ext uri="{386F3935-93C4-4BCD-93E2-E3B085C9AB24}">
-                <p16:designElem xmlns:p16="http://schemas.microsoft.com/office/powerpoint/2015/main" val="1"/>
-              </p:ext>
-            </p:extLst>
-          </p:nvPr>
-        </p:nvSpPr>
-        <p:spPr>
-          <a:xfrm>
-            <a:off x="0" y="0"/>
-            <a:ext cx="12186315" cy="6858000"/>
-          </a:xfrm>
-          <a:prstGeom prst="rect">
-            <a:avLst/>
-          </a:prstGeom>
-          <a:ln>
-            <a:noFill/>
-          </a:ln>
-        </p:spPr>
-        <p:style>
-          <a:lnRef idx="2">
-            <a:schemeClr val="accent6">
-              <a:shade val="50000"/>
-            </a:schemeClr>
-          </a:lnRef>
-          <a:fillRef idx="1001">
-            <a:schemeClr val="lt1"/>
-          </a:fillRef>
-          <a:effectRef idx="0">
-            <a:schemeClr val="accent6"/>
-          </a:effectRef>
-          <a:fontRef idx="minor">
-            <a:schemeClr val="lt1"/>
-          </a:fontRef>
-        </p:style>
-        <p:txBody>
-          <a:bodyPr rtlCol="0" anchor="ctr"/>
-          <a:lstStyle/>
-          <a:p>
-            <a:pPr algn="ctr" rtl="0"/>
-            <a:endParaRPr lang="it-IT" dirty="0"/>
-          </a:p>
-        </p:txBody>
-      </p:sp>
-      <p:sp>
-        <p:nvSpPr>
-          <p:cNvPr id="5" name="Titolo 4">
-            <a:extLst>
-              <a:ext uri="{FF2B5EF4-FFF2-40B4-BE49-F238E27FC236}">
-                <a16:creationId xmlns:a16="http://schemas.microsoft.com/office/drawing/2014/main" id="{B8B72B13-069B-4F8A-9437-FA58C3F1D44B}"/>
-              </a:ext>
-            </a:extLst>
-          </p:cNvPr>
-          <p:cNvSpPr>
-            <a:spLocks noGrp="1"/>
-          </p:cNvSpPr>
-          <p:nvPr>
-            <p:ph type="title"/>
-          </p:nvPr>
-        </p:nvSpPr>
-        <p:spPr>
-          <a:xfrm>
-            <a:off x="590927" y="535936"/>
-            <a:ext cx="10864474" cy="700340"/>
-          </a:xfrm>
-        </p:spPr>
-        <p:txBody>
-          <a:bodyPr vert="horz" lIns="91440" tIns="45720" rIns="91440" bIns="45720" rtlCol="0" anchor="b">
-            <a:noAutofit/>
-          </a:bodyPr>
-          <a:lstStyle/>
-          <a:p>
-            <a:pPr rtl="0"/>
-            <a:r>
-              <a:rPr lang="it-IT" sz="4400" dirty="0">
-                <a:solidFill>
-                  <a:schemeClr val="tx1">
-                    <a:lumMod val="75000"/>
-                    <a:lumOff val="25000"/>
-                  </a:schemeClr>
-                </a:solidFill>
-              </a:rPr>
-              <a:t>Tool GCODE</a:t>
-            </a:r>
-          </a:p>
-        </p:txBody>
-      </p:sp>
-      <p:cxnSp>
-        <p:nvCxnSpPr>
-          <p:cNvPr id="30" name="Connettore diritto 34">
-            <a:extLst>
-              <a:ext uri="{FF2B5EF4-FFF2-40B4-BE49-F238E27FC236}">
-                <a16:creationId xmlns:a16="http://schemas.microsoft.com/office/drawing/2014/main" id="{5A0A5CF6-407C-4691-8122-49DF69D0020D}"/>
-              </a:ext>
-              <a:ext uri="{C183D7F6-B498-43B3-948B-1728B52AA6E4}">
-                <adec:decorative xmlns:adec="http://schemas.microsoft.com/office/drawing/2017/decorative" val="1"/>
-              </a:ext>
-            </a:extLst>
-          </p:cNvPr>
-          <p:cNvCxnSpPr>
-            <a:cxnSpLocks noGrp="1" noRot="1" noChangeAspect="1" noMove="1" noResize="1" noEditPoints="1" noAdjustHandles="1" noChangeArrowheads="1" noChangeShapeType="1"/>
-          </p:cNvCxnSpPr>
-          <p:nvPr>
-            <p:extLst>
-              <p:ext uri="{386F3935-93C4-4BCD-93E2-E3B085C9AB24}">
-                <p16:designElem xmlns:p16="http://schemas.microsoft.com/office/powerpoint/2015/main" val="1"/>
-              </p:ext>
-            </p:extLst>
-          </p:nvPr>
-        </p:nvCxnSpPr>
-        <p:spPr>
-          <a:xfrm>
-            <a:off x="590927" y="2633962"/>
-            <a:ext cx="2834640" cy="0"/>
-          </a:xfrm>
-          <a:prstGeom prst="line">
-            <a:avLst/>
-          </a:prstGeom>
-          <a:ln w="12700">
-            <a:solidFill>
-              <a:schemeClr val="tx1">
-                <a:lumMod val="75000"/>
-                <a:lumOff val="25000"/>
-              </a:schemeClr>
-            </a:solidFill>
-          </a:ln>
-        </p:spPr>
-        <p:style>
-          <a:lnRef idx="1">
-            <a:schemeClr val="accent1"/>
-          </a:lnRef>
-          <a:fillRef idx="0">
-            <a:schemeClr val="accent1"/>
-          </a:fillRef>
-          <a:effectRef idx="0">
-            <a:schemeClr val="accent1"/>
-          </a:effectRef>
-          <a:fontRef idx="minor">
-            <a:schemeClr val="tx1"/>
-          </a:fontRef>
-        </p:style>
-      </p:cxnSp>
-      <p:sp>
-        <p:nvSpPr>
-          <p:cNvPr id="4" name="Rettangolo 3">
-            <a:extLst>
-              <a:ext uri="{FF2B5EF4-FFF2-40B4-BE49-F238E27FC236}">
-                <a16:creationId xmlns:a16="http://schemas.microsoft.com/office/drawing/2014/main" id="{D22E5227-66DC-4545-A93A-3BAE57987144}"/>
-              </a:ext>
-            </a:extLst>
-          </p:cNvPr>
-          <p:cNvSpPr/>
-          <p:nvPr/>
-        </p:nvSpPr>
-        <p:spPr>
-          <a:xfrm>
-            <a:off x="590927" y="2477070"/>
-            <a:ext cx="2955837" cy="457195"/>
-          </a:xfrm>
-          <a:prstGeom prst="rect">
-            <a:avLst/>
-          </a:prstGeom>
-          <a:solidFill>
-            <a:schemeClr val="bg1"/>
-          </a:solidFill>
-          <a:ln>
-            <a:solidFill>
-              <a:schemeClr val="bg1"/>
-            </a:solidFill>
-          </a:ln>
-        </p:spPr>
-        <p:style>
-          <a:lnRef idx="2">
-            <a:schemeClr val="accent1">
-              <a:shade val="50000"/>
-            </a:schemeClr>
-          </a:lnRef>
-          <a:fillRef idx="1">
-            <a:schemeClr val="accent1"/>
-          </a:fillRef>
-          <a:effectRef idx="0">
-            <a:schemeClr val="accent1"/>
-          </a:effectRef>
-          <a:fontRef idx="minor">
-            <a:schemeClr val="lt1"/>
-          </a:fontRef>
-        </p:style>
-        <p:txBody>
-          <a:bodyPr rtlCol="0" anchor="ctr"/>
-          <a:lstStyle/>
-          <a:p>
-            <a:pPr algn="ctr"/>
-            <a:endParaRPr lang="it-IT"/>
-          </a:p>
-        </p:txBody>
-      </p:sp>
-      <p:sp>
-        <p:nvSpPr>
-          <p:cNvPr id="6" name="Segnaposto contenuto 5">
-            <a:extLst>
-              <a:ext uri="{FF2B5EF4-FFF2-40B4-BE49-F238E27FC236}">
-                <a16:creationId xmlns:a16="http://schemas.microsoft.com/office/drawing/2014/main" id="{2281D70C-EE29-493E-838C-890184A02C07}"/>
-              </a:ext>
-            </a:extLst>
-          </p:cNvPr>
-          <p:cNvSpPr>
-            <a:spLocks noGrp="1"/>
-          </p:cNvSpPr>
-          <p:nvPr>
-            <p:ph idx="1"/>
-          </p:nvPr>
-        </p:nvSpPr>
-        <p:spPr>
-          <a:xfrm>
-            <a:off x="590926" y="1452869"/>
-            <a:ext cx="5312570" cy="4286825"/>
-          </a:xfrm>
-        </p:spPr>
-        <p:txBody>
-          <a:bodyPr vert="horz" lIns="0" tIns="45720" rIns="0" bIns="45720" rtlCol="0">
-            <a:normAutofit/>
-          </a:bodyPr>
-          <a:lstStyle/>
-          <a:p>
-            <a:pPr marL="0" indent="0">
-              <a:buNone/>
-            </a:pPr>
-            <a:r>
-              <a:rPr lang="it-IT" dirty="0">
-                <a:latin typeface="+mj-lt"/>
-              </a:rPr>
-              <a:t>Il tool una volta avviato il file presenterà il conoscimento della configurazione iniziale</a:t>
-            </a:r>
-          </a:p>
-          <a:p>
-            <a:r>
-              <a:rPr lang="it-IT" dirty="0">
-                <a:latin typeface="+mj-lt"/>
-              </a:rPr>
-              <a:t>Il tool supporta il riconoscimento si coordinate sia assolute che relative</a:t>
-            </a:r>
-          </a:p>
-          <a:p>
-            <a:r>
-              <a:rPr lang="it-IT" dirty="0">
-                <a:latin typeface="+mj-lt"/>
-              </a:rPr>
-              <a:t>In questa funzionalità è fondamentale per la successiva funzionalità di disegno del percorso</a:t>
-            </a:r>
-          </a:p>
-        </p:txBody>
-      </p:sp>
-      <p:pic>
-        <p:nvPicPr>
-          <p:cNvPr id="10" name="Elemento grafico 9">
-            <a:extLst>
-              <a:ext uri="{FF2B5EF4-FFF2-40B4-BE49-F238E27FC236}">
-                <a16:creationId xmlns:a16="http://schemas.microsoft.com/office/drawing/2014/main" id="{54A47743-7725-4A33-93CA-EFB89C10D1EC}"/>
-              </a:ext>
-            </a:extLst>
-          </p:cNvPr>
-          <p:cNvPicPr>
-            <a:picLocks noChangeAspect="1"/>
-          </p:cNvPicPr>
-          <p:nvPr/>
-        </p:nvPicPr>
-        <p:blipFill>
-          <a:blip r:embed="rId3" cstate="print">
-            <a:extLst>
-              <a:ext uri="{28A0092B-C50C-407E-A947-70E740481C1C}">
-                <a14:useLocalDpi xmlns:a14="http://schemas.microsoft.com/office/drawing/2010/main" val="0"/>
-              </a:ext>
-              <a:ext uri="{96DAC541-7B7A-43D3-8B79-37D633B846F1}">
-                <asvg:svgBlip xmlns:asvg="http://schemas.microsoft.com/office/drawing/2016/SVG/main" r:embed="rId4"/>
-              </a:ext>
-            </a:extLst>
-          </a:blip>
-          <a:stretch>
-            <a:fillRect/>
-          </a:stretch>
-        </p:blipFill>
-        <p:spPr>
-          <a:xfrm>
-            <a:off x="207095" y="6043750"/>
-            <a:ext cx="1770209" cy="700341"/>
-          </a:xfrm>
-          <a:prstGeom prst="rect">
-            <a:avLst/>
-          </a:prstGeom>
-        </p:spPr>
-      </p:pic>
-      <p:sp>
-        <p:nvSpPr>
-          <p:cNvPr id="12" name="Connettore 11">
-            <a:extLst>
-              <a:ext uri="{FF2B5EF4-FFF2-40B4-BE49-F238E27FC236}">
-                <a16:creationId xmlns:a16="http://schemas.microsoft.com/office/drawing/2014/main" id="{92095D8C-8CCA-4CC6-B2D2-E1BC4732F321}"/>
-              </a:ext>
-            </a:extLst>
-          </p:cNvPr>
-          <p:cNvSpPr/>
-          <p:nvPr/>
-        </p:nvSpPr>
-        <p:spPr>
-          <a:xfrm>
-            <a:off x="11455401" y="6273800"/>
-            <a:ext cx="512910" cy="470291"/>
-          </a:xfrm>
-          <a:prstGeom prst="flowChartConnector">
-            <a:avLst/>
-          </a:prstGeom>
-        </p:spPr>
-        <p:style>
-          <a:lnRef idx="2">
-            <a:schemeClr val="accent1">
-              <a:shade val="50000"/>
-            </a:schemeClr>
-          </a:lnRef>
-          <a:fillRef idx="1">
-            <a:schemeClr val="accent1"/>
-          </a:fillRef>
-          <a:effectRef idx="0">
-            <a:schemeClr val="accent1"/>
-          </a:effectRef>
-          <a:fontRef idx="minor">
-            <a:schemeClr val="lt1"/>
-          </a:fontRef>
-        </p:style>
         <p:txBody>
           <a:bodyPr rtlCol="0" anchor="ctr"/>
           <a:lstStyle/>
@@ -14422,40 +14144,63 @@
           </a:p>
         </p:txBody>
       </p:sp>
-      <p:pic>
-        <p:nvPicPr>
-          <p:cNvPr id="8" name="Immagine 7">
-            <a:extLst>
-              <a:ext uri="{FF2B5EF4-FFF2-40B4-BE49-F238E27FC236}">
-                <a16:creationId xmlns:a16="http://schemas.microsoft.com/office/drawing/2014/main" id="{E85448AD-BA5D-FA09-8AB6-DABDDA6BE33F}"/>
-              </a:ext>
-            </a:extLst>
-          </p:cNvPr>
-          <p:cNvPicPr>
-            <a:picLocks noChangeAspect="1"/>
-          </p:cNvPicPr>
-          <p:nvPr/>
-        </p:nvPicPr>
-        <p:blipFill>
-          <a:blip r:embed="rId5"/>
-          <a:stretch>
-            <a:fillRect/>
-          </a:stretch>
-        </p:blipFill>
-        <p:spPr>
-          <a:xfrm>
-            <a:off x="5843824" y="1516217"/>
-            <a:ext cx="6124487" cy="3114367"/>
-          </a:xfrm>
-          <a:prstGeom prst="rect">
-            <a:avLst/>
-          </a:prstGeom>
-        </p:spPr>
-      </p:pic>
+      <p:sp>
+        <p:nvSpPr>
+          <p:cNvPr id="3" name="Segnaposto contenuto 2">
+            <a:extLst>
+              <a:ext uri="{FF2B5EF4-FFF2-40B4-BE49-F238E27FC236}">
+                <a16:creationId xmlns:a16="http://schemas.microsoft.com/office/drawing/2014/main" id="{CDBDD0AC-B78E-4283-B5F3-A381229EABF5}"/>
+              </a:ext>
+            </a:extLst>
+          </p:cNvPr>
+          <p:cNvSpPr>
+            <a:spLocks noGrp="1"/>
+          </p:cNvSpPr>
+          <p:nvPr>
+            <p:ph idx="1"/>
+          </p:nvPr>
+        </p:nvSpPr>
+        <p:spPr>
+          <a:xfrm>
+            <a:off x="1216547" y="2108201"/>
+            <a:ext cx="10058399" cy="3760891"/>
+          </a:xfrm>
+        </p:spPr>
+        <p:txBody>
+          <a:bodyPr>
+            <a:normAutofit/>
+          </a:bodyPr>
+          <a:lstStyle/>
+          <a:p>
+            <a:r>
+              <a:rPr lang="it-IT" sz="2400" dirty="0">
+                <a:latin typeface="+mj-lt"/>
+              </a:rPr>
+              <a:t>Il tool è stato pensato per facilitare la traduzione del programma caricato sulla macchina, in modo da renderlo comprensibile anche a un operatore non familiare con il linguaggio</a:t>
+            </a:r>
+          </a:p>
+          <a:p>
+            <a:r>
+              <a:rPr lang="it-IT" sz="2400" dirty="0">
+                <a:latin typeface="+mj-lt"/>
+              </a:rPr>
+              <a:t>Ciò implica anche altre funzionalità indirette: ovvero come strumento di prototipazione e formazione per gli addetti al settore </a:t>
+            </a:r>
+          </a:p>
+          <a:p>
+            <a:r>
+              <a:rPr lang="it-IT" sz="2400" dirty="0">
+                <a:latin typeface="+mj-lt"/>
+              </a:rPr>
+              <a:t>Permette inoltre di verificare il cammino seguito da un ipotetico utensile nel suo campo d’azione, che sia di taglio o fresatura. Ciò permette di verificare la correttezza della lavorazione, e quindi del programma</a:t>
+            </a:r>
+          </a:p>
+        </p:txBody>
+      </p:sp>
     </p:spTree>
     <p:extLst>
       <p:ext uri="{BB962C8B-B14F-4D97-AF65-F5344CB8AC3E}">
-        <p14:creationId xmlns:p14="http://schemas.microsoft.com/office/powerpoint/2010/main" val="243730368"/>
+        <p14:creationId xmlns:p14="http://schemas.microsoft.com/office/powerpoint/2010/main" val="1760537178"/>
       </p:ext>
     </p:extLst>
   </p:cSld>
@@ -14492,41 +14237,107 @@
       </p:grpSpPr>
       <p:sp>
         <p:nvSpPr>
-          <p:cNvPr id="26" name="Rettangolo 28">
-            <a:extLst>
-              <a:ext uri="{FF2B5EF4-FFF2-40B4-BE49-F238E27FC236}">
-                <a16:creationId xmlns:a16="http://schemas.microsoft.com/office/drawing/2014/main" id="{416A0E3C-60E6-4F39-BC55-5F7C224E1F7C}"/>
-              </a:ext>
-              <a:ext uri="{C183D7F6-B498-43B3-948B-1728B52AA6E4}">
-                <adec:decorative xmlns:adec="http://schemas.microsoft.com/office/drawing/2017/decorative" val="1"/>
-              </a:ext>
-            </a:extLst>
-          </p:cNvPr>
-          <p:cNvSpPr>
-            <a:spLocks noGrp="1" noRot="1" noChangeAspect="1" noMove="1" noResize="1" noEditPoints="1" noAdjustHandles="1" noChangeArrowheads="1" noChangeShapeType="1" noTextEdit="1"/>
-          </p:cNvSpPr>
-          <p:nvPr>
-            <p:extLst>
-              <p:ext uri="{386F3935-93C4-4BCD-93E2-E3B085C9AB24}">
-                <p16:designElem xmlns:p16="http://schemas.microsoft.com/office/powerpoint/2015/main" val="1"/>
-              </p:ext>
-            </p:extLst>
-          </p:nvPr>
-        </p:nvSpPr>
-        <p:spPr>
-          <a:xfrm>
-            <a:off x="3175" y="6400800"/>
-            <a:ext cx="12188825" cy="457200"/>
+          <p:cNvPr id="6" name="Titolo 5">
+            <a:extLst>
+              <a:ext uri="{FF2B5EF4-FFF2-40B4-BE49-F238E27FC236}">
+                <a16:creationId xmlns:a16="http://schemas.microsoft.com/office/drawing/2014/main" id="{CE09A200-4838-4284-BD1E-19701CABB5FE}"/>
+              </a:ext>
+            </a:extLst>
+          </p:cNvPr>
+          <p:cNvSpPr>
+            <a:spLocks noGrp="1"/>
+          </p:cNvSpPr>
+          <p:nvPr>
+            <p:ph type="title"/>
+          </p:nvPr>
+        </p:nvSpPr>
+        <p:spPr>
+          <a:xfrm>
+            <a:off x="1097280" y="286603"/>
+            <a:ext cx="10058400" cy="1450757"/>
+          </a:xfrm>
+        </p:spPr>
+        <p:txBody>
+          <a:bodyPr rtlCol="0">
+            <a:normAutofit/>
+          </a:bodyPr>
+          <a:lstStyle/>
+          <a:p>
+            <a:pPr rtl="0"/>
+            <a:r>
+              <a:rPr lang="it-IT" sz="4800" dirty="0">
+                <a:solidFill>
+                  <a:schemeClr val="tx1">
+                    <a:lumMod val="75000"/>
+                    <a:lumOff val="25000"/>
+                  </a:schemeClr>
+                </a:solidFill>
+              </a:rPr>
+              <a:t>Interfaccia del GCODE</a:t>
+            </a:r>
+            <a:endParaRPr lang="it-IT" dirty="0"/>
+          </a:p>
+        </p:txBody>
+      </p:sp>
+      <p:pic>
+        <p:nvPicPr>
+          <p:cNvPr id="4" name="Elemento grafico 3">
+            <a:extLst>
+              <a:ext uri="{FF2B5EF4-FFF2-40B4-BE49-F238E27FC236}">
+                <a16:creationId xmlns:a16="http://schemas.microsoft.com/office/drawing/2014/main" id="{ED0A95A1-BC85-4809-B935-6A9B3C054422}"/>
+              </a:ext>
+            </a:extLst>
+          </p:cNvPr>
+          <p:cNvPicPr>
+            <a:picLocks noChangeAspect="1"/>
+          </p:cNvPicPr>
+          <p:nvPr/>
+        </p:nvPicPr>
+        <p:blipFill>
+          <a:blip r:embed="rId3" cstate="print">
+            <a:extLst>
+              <a:ext uri="{28A0092B-C50C-407E-A947-70E740481C1C}">
+                <a14:useLocalDpi xmlns:a14="http://schemas.microsoft.com/office/drawing/2010/main" val="0"/>
+              </a:ext>
+              <a:ext uri="{96DAC541-7B7A-43D3-8B79-37D633B846F1}">
+                <asvg:svgBlip xmlns:asvg="http://schemas.microsoft.com/office/drawing/2016/SVG/main" r:embed="rId4"/>
+              </a:ext>
+            </a:extLst>
+          </a:blip>
+          <a:stretch>
+            <a:fillRect/>
+          </a:stretch>
+        </p:blipFill>
+        <p:spPr>
+          <a:xfrm>
+            <a:off x="207095" y="6043750"/>
+            <a:ext cx="1770209" cy="700341"/>
           </a:xfrm>
           <a:prstGeom prst="rect">
             <a:avLst/>
           </a:prstGeom>
-          <a:solidFill>
-            <a:srgbClr val="262626"/>
-          </a:solidFill>
-          <a:ln>
-            <a:noFill/>
-          </a:ln>
+        </p:spPr>
+      </p:pic>
+      <p:sp>
+        <p:nvSpPr>
+          <p:cNvPr id="10" name="Connettore 9">
+            <a:extLst>
+              <a:ext uri="{FF2B5EF4-FFF2-40B4-BE49-F238E27FC236}">
+                <a16:creationId xmlns:a16="http://schemas.microsoft.com/office/drawing/2014/main" id="{7DA3C5E2-1B7C-406E-9A80-B7F344044586}"/>
+              </a:ext>
+            </a:extLst>
+          </p:cNvPr>
+          <p:cNvSpPr/>
+          <p:nvPr/>
+        </p:nvSpPr>
+        <p:spPr>
+          <a:xfrm>
+            <a:off x="11455401" y="6273800"/>
+            <a:ext cx="512910" cy="470291"/>
+          </a:xfrm>
+          <a:prstGeom prst="flowChartConnector">
+            <a:avLst/>
+          </a:prstGeom>
         </p:spPr>
         <p:style>
           <a:lnRef idx="2">
@@ -14544,390 +14355,6 @@
             <a:schemeClr val="lt1"/>
           </a:fontRef>
         </p:style>
-      </p:sp>
-      <p:cxnSp>
-        <p:nvCxnSpPr>
-          <p:cNvPr id="27" name="Connettore diritto 30">
-            <a:extLst>
-              <a:ext uri="{FF2B5EF4-FFF2-40B4-BE49-F238E27FC236}">
-                <a16:creationId xmlns:a16="http://schemas.microsoft.com/office/drawing/2014/main" id="{C5025DAC-8B93-4160-B017-3A274A5828C0}"/>
-              </a:ext>
-              <a:ext uri="{C183D7F6-B498-43B3-948B-1728B52AA6E4}">
-                <adec:decorative xmlns:adec="http://schemas.microsoft.com/office/drawing/2017/decorative" val="1"/>
-              </a:ext>
-            </a:extLst>
-          </p:cNvPr>
-          <p:cNvCxnSpPr>
-            <a:cxnSpLocks noGrp="1" noRot="1" noChangeAspect="1" noMove="1" noResize="1" noEditPoints="1" noAdjustHandles="1" noChangeArrowheads="1" noChangeShapeType="1"/>
-          </p:cNvCxnSpPr>
-          <p:nvPr>
-            <p:extLst>
-              <p:ext uri="{386F3935-93C4-4BCD-93E2-E3B085C9AB24}">
-                <p16:designElem xmlns:p16="http://schemas.microsoft.com/office/powerpoint/2015/main" val="1"/>
-              </p:ext>
-            </p:extLst>
-          </p:nvPr>
-        </p:nvCxnSpPr>
-        <p:spPr>
-          <a:xfrm>
-            <a:off x="1193532" y="1897380"/>
-            <a:ext cx="9966960" cy="0"/>
-          </a:xfrm>
-          <a:prstGeom prst="line">
-            <a:avLst/>
-          </a:prstGeom>
-          <a:ln w="12700">
-            <a:solidFill>
-              <a:schemeClr val="tx1">
-                <a:lumMod val="75000"/>
-                <a:lumOff val="25000"/>
-              </a:schemeClr>
-            </a:solidFill>
-          </a:ln>
-        </p:spPr>
-        <p:style>
-          <a:lnRef idx="1">
-            <a:schemeClr val="accent1"/>
-          </a:lnRef>
-          <a:fillRef idx="0">
-            <a:schemeClr val="accent1"/>
-          </a:fillRef>
-          <a:effectRef idx="0">
-            <a:schemeClr val="accent1"/>
-          </a:effectRef>
-          <a:fontRef idx="minor">
-            <a:schemeClr val="tx1"/>
-          </a:fontRef>
-        </p:style>
-      </p:cxnSp>
-      <p:sp useBgFill="1">
-        <p:nvSpPr>
-          <p:cNvPr id="28" name="Rettangolo 32">
-            <a:extLst>
-              <a:ext uri="{FF2B5EF4-FFF2-40B4-BE49-F238E27FC236}">
-                <a16:creationId xmlns:a16="http://schemas.microsoft.com/office/drawing/2014/main" id="{990D0034-F768-41E7-85D4-F38C4DE85770}"/>
-              </a:ext>
-              <a:ext uri="{C183D7F6-B498-43B3-948B-1728B52AA6E4}">
-                <adec:decorative xmlns:adec="http://schemas.microsoft.com/office/drawing/2017/decorative" val="1"/>
-              </a:ext>
-            </a:extLst>
-          </p:cNvPr>
-          <p:cNvSpPr>
-            <a:spLocks noGrp="1" noRot="1" noChangeAspect="1" noMove="1" noResize="1" noEditPoints="1" noAdjustHandles="1" noChangeArrowheads="1" noChangeShapeType="1" noTextEdit="1"/>
-          </p:cNvSpPr>
-          <p:nvPr>
-            <p:extLst>
-              <p:ext uri="{386F3935-93C4-4BCD-93E2-E3B085C9AB24}">
-                <p16:designElem xmlns:p16="http://schemas.microsoft.com/office/powerpoint/2015/main" val="1"/>
-              </p:ext>
-            </p:extLst>
-          </p:nvPr>
-        </p:nvSpPr>
-        <p:spPr>
-          <a:xfrm>
-            <a:off x="0" y="0"/>
-            <a:ext cx="12186315" cy="6858000"/>
-          </a:xfrm>
-          <a:prstGeom prst="rect">
-            <a:avLst/>
-          </a:prstGeom>
-          <a:ln>
-            <a:noFill/>
-          </a:ln>
-        </p:spPr>
-        <p:style>
-          <a:lnRef idx="2">
-            <a:schemeClr val="accent6">
-              <a:shade val="50000"/>
-            </a:schemeClr>
-          </a:lnRef>
-          <a:fillRef idx="1001">
-            <a:schemeClr val="lt1"/>
-          </a:fillRef>
-          <a:effectRef idx="0">
-            <a:schemeClr val="accent6"/>
-          </a:effectRef>
-          <a:fontRef idx="minor">
-            <a:schemeClr val="lt1"/>
-          </a:fontRef>
-        </p:style>
-        <p:txBody>
-          <a:bodyPr rtlCol="0" anchor="ctr"/>
-          <a:lstStyle/>
-          <a:p>
-            <a:pPr algn="ctr" rtl="0"/>
-            <a:endParaRPr lang="it-IT" dirty="0"/>
-          </a:p>
-        </p:txBody>
-      </p:sp>
-      <p:sp>
-        <p:nvSpPr>
-          <p:cNvPr id="5" name="Titolo 4">
-            <a:extLst>
-              <a:ext uri="{FF2B5EF4-FFF2-40B4-BE49-F238E27FC236}">
-                <a16:creationId xmlns:a16="http://schemas.microsoft.com/office/drawing/2014/main" id="{B8B72B13-069B-4F8A-9437-FA58C3F1D44B}"/>
-              </a:ext>
-            </a:extLst>
-          </p:cNvPr>
-          <p:cNvSpPr>
-            <a:spLocks noGrp="1"/>
-          </p:cNvSpPr>
-          <p:nvPr>
-            <p:ph type="title"/>
-          </p:nvPr>
-        </p:nvSpPr>
-        <p:spPr>
-          <a:xfrm>
-            <a:off x="590927" y="535936"/>
-            <a:ext cx="10864474" cy="700340"/>
-          </a:xfrm>
-        </p:spPr>
-        <p:txBody>
-          <a:bodyPr vert="horz" lIns="91440" tIns="45720" rIns="91440" bIns="45720" rtlCol="0" anchor="b">
-            <a:noAutofit/>
-          </a:bodyPr>
-          <a:lstStyle/>
-          <a:p>
-            <a:pPr rtl="0"/>
-            <a:r>
-              <a:rPr lang="it-IT" sz="4400" dirty="0">
-                <a:solidFill>
-                  <a:schemeClr val="tx1">
-                    <a:lumMod val="75000"/>
-                    <a:lumOff val="25000"/>
-                  </a:schemeClr>
-                </a:solidFill>
-              </a:rPr>
-              <a:t>Tool GCODE</a:t>
-            </a:r>
-          </a:p>
-        </p:txBody>
-      </p:sp>
-      <p:cxnSp>
-        <p:nvCxnSpPr>
-          <p:cNvPr id="30" name="Connettore diritto 34">
-            <a:extLst>
-              <a:ext uri="{FF2B5EF4-FFF2-40B4-BE49-F238E27FC236}">
-                <a16:creationId xmlns:a16="http://schemas.microsoft.com/office/drawing/2014/main" id="{5A0A5CF6-407C-4691-8122-49DF69D0020D}"/>
-              </a:ext>
-              <a:ext uri="{C183D7F6-B498-43B3-948B-1728B52AA6E4}">
-                <adec:decorative xmlns:adec="http://schemas.microsoft.com/office/drawing/2017/decorative" val="1"/>
-              </a:ext>
-            </a:extLst>
-          </p:cNvPr>
-          <p:cNvCxnSpPr>
-            <a:cxnSpLocks noGrp="1" noRot="1" noChangeAspect="1" noMove="1" noResize="1" noEditPoints="1" noAdjustHandles="1" noChangeArrowheads="1" noChangeShapeType="1"/>
-          </p:cNvCxnSpPr>
-          <p:nvPr>
-            <p:extLst>
-              <p:ext uri="{386F3935-93C4-4BCD-93E2-E3B085C9AB24}">
-                <p16:designElem xmlns:p16="http://schemas.microsoft.com/office/powerpoint/2015/main" val="1"/>
-              </p:ext>
-            </p:extLst>
-          </p:nvPr>
-        </p:nvCxnSpPr>
-        <p:spPr>
-          <a:xfrm>
-            <a:off x="590927" y="2633962"/>
-            <a:ext cx="2834640" cy="0"/>
-          </a:xfrm>
-          <a:prstGeom prst="line">
-            <a:avLst/>
-          </a:prstGeom>
-          <a:ln w="12700">
-            <a:solidFill>
-              <a:schemeClr val="tx1">
-                <a:lumMod val="75000"/>
-                <a:lumOff val="25000"/>
-              </a:schemeClr>
-            </a:solidFill>
-          </a:ln>
-        </p:spPr>
-        <p:style>
-          <a:lnRef idx="1">
-            <a:schemeClr val="accent1"/>
-          </a:lnRef>
-          <a:fillRef idx="0">
-            <a:schemeClr val="accent1"/>
-          </a:fillRef>
-          <a:effectRef idx="0">
-            <a:schemeClr val="accent1"/>
-          </a:effectRef>
-          <a:fontRef idx="minor">
-            <a:schemeClr val="tx1"/>
-          </a:fontRef>
-        </p:style>
-      </p:cxnSp>
-      <p:sp>
-        <p:nvSpPr>
-          <p:cNvPr id="4" name="Rettangolo 3">
-            <a:extLst>
-              <a:ext uri="{FF2B5EF4-FFF2-40B4-BE49-F238E27FC236}">
-                <a16:creationId xmlns:a16="http://schemas.microsoft.com/office/drawing/2014/main" id="{D22E5227-66DC-4545-A93A-3BAE57987144}"/>
-              </a:ext>
-            </a:extLst>
-          </p:cNvPr>
-          <p:cNvSpPr/>
-          <p:nvPr/>
-        </p:nvSpPr>
-        <p:spPr>
-          <a:xfrm>
-            <a:off x="590927" y="2477070"/>
-            <a:ext cx="2955837" cy="457195"/>
-          </a:xfrm>
-          <a:prstGeom prst="rect">
-            <a:avLst/>
-          </a:prstGeom>
-          <a:solidFill>
-            <a:schemeClr val="bg1"/>
-          </a:solidFill>
-          <a:ln>
-            <a:solidFill>
-              <a:schemeClr val="bg1"/>
-            </a:solidFill>
-          </a:ln>
-        </p:spPr>
-        <p:style>
-          <a:lnRef idx="2">
-            <a:schemeClr val="accent1">
-              <a:shade val="50000"/>
-            </a:schemeClr>
-          </a:lnRef>
-          <a:fillRef idx="1">
-            <a:schemeClr val="accent1"/>
-          </a:fillRef>
-          <a:effectRef idx="0">
-            <a:schemeClr val="accent1"/>
-          </a:effectRef>
-          <a:fontRef idx="minor">
-            <a:schemeClr val="lt1"/>
-          </a:fontRef>
-        </p:style>
-        <p:txBody>
-          <a:bodyPr rtlCol="0" anchor="ctr"/>
-          <a:lstStyle/>
-          <a:p>
-            <a:pPr algn="ctr"/>
-            <a:endParaRPr lang="it-IT"/>
-          </a:p>
-        </p:txBody>
-      </p:sp>
-      <p:sp>
-        <p:nvSpPr>
-          <p:cNvPr id="6" name="Segnaposto contenuto 5">
-            <a:extLst>
-              <a:ext uri="{FF2B5EF4-FFF2-40B4-BE49-F238E27FC236}">
-                <a16:creationId xmlns:a16="http://schemas.microsoft.com/office/drawing/2014/main" id="{2281D70C-EE29-493E-838C-890184A02C07}"/>
-              </a:ext>
-            </a:extLst>
-          </p:cNvPr>
-          <p:cNvSpPr>
-            <a:spLocks noGrp="1"/>
-          </p:cNvSpPr>
-          <p:nvPr>
-            <p:ph idx="1"/>
-          </p:nvPr>
-        </p:nvSpPr>
-        <p:spPr>
-          <a:xfrm>
-            <a:off x="590925" y="1452870"/>
-            <a:ext cx="10864473" cy="805314"/>
-          </a:xfrm>
-        </p:spPr>
-        <p:txBody>
-          <a:bodyPr vert="horz" lIns="0" tIns="45720" rIns="0" bIns="45720" rtlCol="0">
-            <a:normAutofit lnSpcReduction="10000"/>
-          </a:bodyPr>
-          <a:lstStyle/>
-          <a:p>
-            <a:pPr marL="0" indent="0">
-              <a:buNone/>
-            </a:pPr>
-            <a:r>
-              <a:rPr lang="it-IT" dirty="0">
-                <a:latin typeface="+mj-lt"/>
-              </a:rPr>
-              <a:t>Successivamente verrà mostrata una traduzione dei movimenti contenuti nel programma e della configurazione d’uscita</a:t>
-            </a:r>
-          </a:p>
-        </p:txBody>
-      </p:sp>
-      <p:pic>
-        <p:nvPicPr>
-          <p:cNvPr id="10" name="Elemento grafico 9">
-            <a:extLst>
-              <a:ext uri="{FF2B5EF4-FFF2-40B4-BE49-F238E27FC236}">
-                <a16:creationId xmlns:a16="http://schemas.microsoft.com/office/drawing/2014/main" id="{54A47743-7725-4A33-93CA-EFB89C10D1EC}"/>
-              </a:ext>
-            </a:extLst>
-          </p:cNvPr>
-          <p:cNvPicPr>
-            <a:picLocks noChangeAspect="1"/>
-          </p:cNvPicPr>
-          <p:nvPr/>
-        </p:nvPicPr>
-        <p:blipFill>
-          <a:blip r:embed="rId3" cstate="print">
-            <a:extLst>
-              <a:ext uri="{28A0092B-C50C-407E-A947-70E740481C1C}">
-                <a14:useLocalDpi xmlns:a14="http://schemas.microsoft.com/office/drawing/2010/main" val="0"/>
-              </a:ext>
-              <a:ext uri="{96DAC541-7B7A-43D3-8B79-37D633B846F1}">
-                <asvg:svgBlip xmlns:asvg="http://schemas.microsoft.com/office/drawing/2016/SVG/main" r:embed="rId4"/>
-              </a:ext>
-            </a:extLst>
-          </a:blip>
-          <a:stretch>
-            <a:fillRect/>
-          </a:stretch>
-        </p:blipFill>
-        <p:spPr>
-          <a:xfrm>
-            <a:off x="207095" y="6043750"/>
-            <a:ext cx="1770209" cy="700341"/>
-          </a:xfrm>
-          <a:prstGeom prst="rect">
-            <a:avLst/>
-          </a:prstGeom>
-        </p:spPr>
-      </p:pic>
-      <p:sp>
-        <p:nvSpPr>
-          <p:cNvPr id="12" name="Connettore 11">
-            <a:extLst>
-              <a:ext uri="{FF2B5EF4-FFF2-40B4-BE49-F238E27FC236}">
-                <a16:creationId xmlns:a16="http://schemas.microsoft.com/office/drawing/2014/main" id="{92095D8C-8CCA-4CC6-B2D2-E1BC4732F321}"/>
-              </a:ext>
-            </a:extLst>
-          </p:cNvPr>
-          <p:cNvSpPr/>
-          <p:nvPr/>
-        </p:nvSpPr>
-        <p:spPr>
-          <a:xfrm>
-            <a:off x="11455401" y="6273800"/>
-            <a:ext cx="512910" cy="470291"/>
-          </a:xfrm>
-          <a:prstGeom prst="flowChartConnector">
-            <a:avLst/>
-          </a:prstGeom>
-        </p:spPr>
-        <p:style>
-          <a:lnRef idx="2">
-            <a:schemeClr val="accent1">
-              <a:shade val="50000"/>
-            </a:schemeClr>
-          </a:lnRef>
-          <a:fillRef idx="1">
-            <a:schemeClr val="accent1"/>
-          </a:fillRef>
-          <a:effectRef idx="0">
-            <a:schemeClr val="accent1"/>
-          </a:effectRef>
-          <a:fontRef idx="minor">
-            <a:schemeClr val="lt1"/>
-          </a:fontRef>
-        </p:style>
         <p:txBody>
           <a:bodyPr rtlCol="0" anchor="ctr"/>
           <a:lstStyle/>
@@ -14942,12 +14369,69 @@
           </a:p>
         </p:txBody>
       </p:sp>
+      <p:sp>
+        <p:nvSpPr>
+          <p:cNvPr id="3" name="Segnaposto contenuto 2">
+            <a:extLst>
+              <a:ext uri="{FF2B5EF4-FFF2-40B4-BE49-F238E27FC236}">
+                <a16:creationId xmlns:a16="http://schemas.microsoft.com/office/drawing/2014/main" id="{CDBDD0AC-B78E-4283-B5F3-A381229EABF5}"/>
+              </a:ext>
+            </a:extLst>
+          </p:cNvPr>
+          <p:cNvSpPr>
+            <a:spLocks noGrp="1"/>
+          </p:cNvSpPr>
+          <p:nvPr>
+            <p:ph idx="1"/>
+          </p:nvPr>
+        </p:nvSpPr>
+        <p:spPr>
+          <a:xfrm>
+            <a:off x="1216547" y="2108201"/>
+            <a:ext cx="4057417" cy="3760891"/>
+          </a:xfrm>
+        </p:spPr>
+        <p:txBody>
+          <a:bodyPr>
+            <a:noAutofit/>
+          </a:bodyPr>
+          <a:lstStyle/>
+          <a:p>
+            <a:r>
+              <a:rPr lang="it-IT" sz="2400" dirty="0">
+                <a:latin typeface="+mj-lt"/>
+              </a:rPr>
+              <a:t>Inizializzato il riconoscimento, comparirà sulla </a:t>
+            </a:r>
+            <a:r>
+              <a:rPr lang="it-IT" sz="2400" dirty="0" err="1">
+                <a:latin typeface="+mj-lt"/>
+              </a:rPr>
+              <a:t>dash</a:t>
+            </a:r>
+            <a:r>
+              <a:rPr lang="it-IT" sz="2400" dirty="0">
+                <a:latin typeface="+mj-lt"/>
+              </a:rPr>
+              <a:t> di destra un disegno dei movimenti seguiti dal mandrino. </a:t>
+            </a:r>
+          </a:p>
+          <a:p>
+            <a:r>
+              <a:rPr lang="it-IT" sz="2400" dirty="0">
+                <a:latin typeface="+mj-lt"/>
+              </a:rPr>
+              <a:t>Sulla parte di sinistra è presente invece una traduzione informale in italiano dei comandi riconosciuti</a:t>
+            </a:r>
+          </a:p>
+        </p:txBody>
+      </p:sp>
       <p:pic>
         <p:nvPicPr>
-          <p:cNvPr id="3" name="Immagine 2">
-            <a:extLst>
-              <a:ext uri="{FF2B5EF4-FFF2-40B4-BE49-F238E27FC236}">
-                <a16:creationId xmlns:a16="http://schemas.microsoft.com/office/drawing/2014/main" id="{3E564E1D-05D0-836B-6FAB-84B43FA59577}"/>
+          <p:cNvPr id="2" name="Immagine 1">
+            <a:extLst>
+              <a:ext uri="{FF2B5EF4-FFF2-40B4-BE49-F238E27FC236}">
+                <a16:creationId xmlns:a16="http://schemas.microsoft.com/office/drawing/2014/main" id="{FF2FA658-D76C-7BE9-82B9-12244A278663}"/>
               </a:ext>
             </a:extLst>
           </p:cNvPr>
@@ -14964,18 +14448,23 @@
         </p:blipFill>
         <p:spPr>
           <a:xfrm>
-            <a:off x="2174176" y="2385184"/>
-            <a:ext cx="8005671" cy="3349039"/>
+            <a:off x="5383835" y="1989009"/>
+            <a:ext cx="6584476" cy="2879982"/>
           </a:xfrm>
           <a:prstGeom prst="rect">
             <a:avLst/>
           </a:prstGeom>
+          <a:ln>
+            <a:solidFill>
+              <a:schemeClr val="tx1"/>
+            </a:solidFill>
+          </a:ln>
         </p:spPr>
       </p:pic>
     </p:spTree>
     <p:extLst>
       <p:ext uri="{BB962C8B-B14F-4D97-AF65-F5344CB8AC3E}">
-        <p14:creationId xmlns:p14="http://schemas.microsoft.com/office/powerpoint/2010/main" val="1635297585"/>
+        <p14:creationId xmlns:p14="http://schemas.microsoft.com/office/powerpoint/2010/main" val="3320995789"/>
       </p:ext>
     </p:extLst>
   </p:cSld>
@@ -15218,7 +14707,7 @@
                   </a:schemeClr>
                 </a:solidFill>
               </a:rPr>
-              <a:t>Tool GCODE</a:t>
+              <a:t>Interfaccia del GCODE: traduzione informale</a:t>
             </a:r>
           </a:p>
         </p:txBody>
@@ -15350,13 +14839,13 @@
         </p:nvSpPr>
         <p:spPr>
           <a:xfrm>
-            <a:off x="590925" y="1452870"/>
-            <a:ext cx="10864473" cy="805314"/>
+            <a:off x="590926" y="1452869"/>
+            <a:ext cx="5312570" cy="4286825"/>
           </a:xfrm>
         </p:spPr>
         <p:txBody>
           <a:bodyPr vert="horz" lIns="0" tIns="45720" rIns="0" bIns="45720" rtlCol="0">
-            <a:normAutofit lnSpcReduction="10000"/>
+            <a:normAutofit/>
           </a:bodyPr>
           <a:lstStyle/>
           <a:p>
@@ -15367,19 +14856,23 @@
               <a:rPr lang="it-IT" dirty="0">
                 <a:latin typeface="+mj-lt"/>
               </a:rPr>
-              <a:t>Infine comparirà sulla </a:t>
-            </a:r>
-            <a:r>
-              <a:rPr lang="it-IT" dirty="0" err="1">
-                <a:latin typeface="+mj-lt"/>
-              </a:rPr>
-              <a:t>dash</a:t>
-            </a:r>
+              <a:t>Il tool una volta avviato presenterà il riconoscimento della configurazione iniziale</a:t>
+            </a:r>
+          </a:p>
+          <a:p>
             <a:r>
               <a:rPr lang="it-IT" dirty="0">
                 <a:latin typeface="+mj-lt"/>
               </a:rPr>
-              <a:t> di destra un disegno dei movimenti seguiti dal mandrino. Il disegno verrà visualizzato solo in caso di comandi leciti impartiti alla macchina</a:t>
+              <a:t>Il tool supporta il riconoscimento si coordinate sia assolute che relative</a:t>
+            </a:r>
+          </a:p>
+          <a:p>
+            <a:r>
+              <a:rPr lang="it-IT" dirty="0">
+                <a:latin typeface="+mj-lt"/>
+              </a:rPr>
+              <a:t>In questa funzionalità è fondamentale per la successiva funzionalità di disegno del percorso</a:t>
             </a:r>
           </a:p>
         </p:txBody>
@@ -15476,10 +14969,10 @@
       </p:sp>
       <p:pic>
         <p:nvPicPr>
-          <p:cNvPr id="9" name="Immagine 8">
-            <a:extLst>
-              <a:ext uri="{FF2B5EF4-FFF2-40B4-BE49-F238E27FC236}">
-                <a16:creationId xmlns:a16="http://schemas.microsoft.com/office/drawing/2014/main" id="{42D463ED-C4B7-5A05-159D-311BC8A70006}"/>
+          <p:cNvPr id="8" name="Immagine 7">
+            <a:extLst>
+              <a:ext uri="{FF2B5EF4-FFF2-40B4-BE49-F238E27FC236}">
+                <a16:creationId xmlns:a16="http://schemas.microsoft.com/office/drawing/2014/main" id="{E85448AD-BA5D-FA09-8AB6-DABDDA6BE33F}"/>
               </a:ext>
             </a:extLst>
           </p:cNvPr>
@@ -15496,18 +14989,23 @@
         </p:blipFill>
         <p:spPr>
           <a:xfrm>
-            <a:off x="1792906" y="2279710"/>
-            <a:ext cx="8460509" cy="3700540"/>
+            <a:off x="5843824" y="1516217"/>
+            <a:ext cx="6124487" cy="3114367"/>
           </a:xfrm>
           <a:prstGeom prst="rect">
             <a:avLst/>
           </a:prstGeom>
+          <a:ln>
+            <a:solidFill>
+              <a:schemeClr val="tx1"/>
+            </a:solidFill>
+          </a:ln>
         </p:spPr>
       </p:pic>
     </p:spTree>
     <p:extLst>
       <p:ext uri="{BB962C8B-B14F-4D97-AF65-F5344CB8AC3E}">
-        <p14:creationId xmlns:p14="http://schemas.microsoft.com/office/powerpoint/2010/main" val="2655228626"/>
+        <p14:creationId xmlns:p14="http://schemas.microsoft.com/office/powerpoint/2010/main" val="4218952577"/>
       </p:ext>
     </p:extLst>
   </p:cSld>
@@ -16391,12 +15889,12 @@
 </file>
 
 <file path=customXml/item1.xml><?xml version="1.0" encoding="utf-8"?>
-<p:properties xmlns:p="http://schemas.microsoft.com/office/2006/metadata/properties" xmlns:xsi="http://www.w3.org/2001/XMLSchema-instance" xmlns:pc="http://schemas.microsoft.com/office/infopath/2007/PartnerControls">
-  <documentManagement>
-    <Status xmlns="71af3243-3dd4-4a8d-8c0d-dd76da1f02a5">Not started</Status>
-    <MediaServiceKeyPoints xmlns="71af3243-3dd4-4a8d-8c0d-dd76da1f02a5" xsi:nil="true"/>
-  </documentManagement>
-</p:properties>
+<?mso-contentType ?>
+<FormTemplates xmlns="http://schemas.microsoft.com/sharepoint/v3/contenttype/forms">
+  <Display>DocumentLibraryForm</Display>
+  <Edit>DocumentLibraryForm</Edit>
+  <New>DocumentLibraryForm</New>
+</FormTemplates>
 </file>
 
 <file path=customXml/item2.xml><?xml version="1.0" encoding="utf-8"?>
@@ -16621,20 +16119,18 @@
 </file>
 
 <file path=customXml/item3.xml><?xml version="1.0" encoding="utf-8"?>
-<?mso-contentType ?>
-<FormTemplates xmlns="http://schemas.microsoft.com/sharepoint/v3/contenttype/forms">
-  <Display>DocumentLibraryForm</Display>
-  <Edit>DocumentLibraryForm</Edit>
-  <New>DocumentLibraryForm</New>
-</FormTemplates>
+<p:properties xmlns:p="http://schemas.microsoft.com/office/2006/metadata/properties" xmlns:xsi="http://www.w3.org/2001/XMLSchema-instance" xmlns:pc="http://schemas.microsoft.com/office/infopath/2007/PartnerControls">
+  <documentManagement>
+    <Status xmlns="71af3243-3dd4-4a8d-8c0d-dd76da1f02a5">Not started</Status>
+    <MediaServiceKeyPoints xmlns="71af3243-3dd4-4a8d-8c0d-dd76da1f02a5" xsi:nil="true"/>
+  </documentManagement>
+</p:properties>
 </file>
 
 <file path=customXml/itemProps1.xml><?xml version="1.0" encoding="utf-8"?>
-<ds:datastoreItem xmlns:ds="http://schemas.openxmlformats.org/officeDocument/2006/customXml" ds:itemID="{A4E879E6-8FFE-4154-8F2A-F7518B89B376}">
+<ds:datastoreItem xmlns:ds="http://schemas.openxmlformats.org/officeDocument/2006/customXml" ds:itemID="{7E0A2CB4-6869-426F-8BC4-A32C90CBE263}">
   <ds:schemaRefs>
-    <ds:schemaRef ds:uri="http://schemas.microsoft.com/office/2006/metadata/properties"/>
-    <ds:schemaRef ds:uri="http://schemas.microsoft.com/office/infopath/2007/PartnerControls"/>
-    <ds:schemaRef ds:uri="71af3243-3dd4-4a8d-8c0d-dd76da1f02a5"/>
+    <ds:schemaRef ds:uri="http://schemas.microsoft.com/sharepoint/v3/contenttype/forms"/>
   </ds:schemaRefs>
 </ds:datastoreItem>
 </file>
@@ -16659,9 +16155,11 @@
 </file>
 
 <file path=customXml/itemProps3.xml><?xml version="1.0" encoding="utf-8"?>
-<ds:datastoreItem xmlns:ds="http://schemas.openxmlformats.org/officeDocument/2006/customXml" ds:itemID="{7E0A2CB4-6869-426F-8BC4-A32C90CBE263}">
+<ds:datastoreItem xmlns:ds="http://schemas.openxmlformats.org/officeDocument/2006/customXml" ds:itemID="{A4E879E6-8FFE-4154-8F2A-F7518B89B376}">
   <ds:schemaRefs>
-    <ds:schemaRef ds:uri="http://schemas.microsoft.com/sharepoint/v3/contenttype/forms"/>
+    <ds:schemaRef ds:uri="http://schemas.microsoft.com/office/2006/metadata/properties"/>
+    <ds:schemaRef ds:uri="http://schemas.microsoft.com/office/infopath/2007/PartnerControls"/>
+    <ds:schemaRef ds:uri="71af3243-3dd4-4a8d-8c0d-dd76da1f02a5"/>
   </ds:schemaRefs>
 </ds:datastoreItem>
 </file>
</xml_diff>

<commit_message>
updated grammar and presentazione, added error description in tecnical manual
</commit_message>
<xml_diff>
--- a/presentazione.pptx
+++ b/presentazione.pptx
@@ -5,10 +5,10 @@
     <p:sldMasterId id="2147483717" r:id="rId4"/>
   </p:sldMasterIdLst>
   <p:notesMasterIdLst>
-    <p:notesMasterId r:id="rId16"/>
+    <p:notesMasterId r:id="rId19"/>
   </p:notesMasterIdLst>
   <p:handoutMasterIdLst>
-    <p:handoutMasterId r:id="rId17"/>
+    <p:handoutMasterId r:id="rId20"/>
   </p:handoutMasterIdLst>
   <p:sldIdLst>
     <p:sldId id="258" r:id="rId5"/>
@@ -22,6 +22,9 @@
     <p:sldId id="302" r:id="rId13"/>
     <p:sldId id="299" r:id="rId14"/>
     <p:sldId id="305" r:id="rId15"/>
+    <p:sldId id="307" r:id="rId16"/>
+    <p:sldId id="308" r:id="rId17"/>
+    <p:sldId id="306" r:id="rId18"/>
   </p:sldIdLst>
   <p:sldSz cx="12192000" cy="6858000"/>
   <p:notesSz cx="6858000" cy="9144000"/>
@@ -227,7 +230,7 @@
             <a:pPr rtl="0"/>
             <a:fld id="{36FC0A7B-6666-4F41-AD03-C74B76B10001}" type="datetime1">
               <a:rPr lang="it-IT" smtClean="0"/>
-              <a:t>11/11/2022</a:t>
+              <a:t>18/11/2022</a:t>
             </a:fld>
             <a:endParaRPr lang="it-IT" dirty="0"/>
           </a:p>
@@ -408,7 +411,7 @@
             <a:fld id="{110E367B-2E0B-461C-8280-86016408BD7C}" type="datetime1">
               <a:rPr lang="it-IT" smtClean="0"/>
               <a:pPr/>
-              <a:t>11/11/2022</a:t>
+              <a:t>18/11/2022</a:t>
             </a:fld>
             <a:endParaRPr lang="it-IT" dirty="0"/>
           </a:p>
@@ -936,6 +939,264 @@
 </p:notes>
 </file>
 
+<file path=ppt/notesSlides/notesSlide12.xml><?xml version="1.0" encoding="utf-8"?>
+<p:notes xmlns:a="http://schemas.openxmlformats.org/drawingml/2006/main" xmlns:r="http://schemas.openxmlformats.org/officeDocument/2006/relationships" xmlns:p="http://schemas.openxmlformats.org/presentationml/2006/main">
+  <p:cSld>
+    <p:spTree>
+      <p:nvGrpSpPr>
+        <p:cNvPr id="1" name=""/>
+        <p:cNvGrpSpPr/>
+        <p:nvPr/>
+      </p:nvGrpSpPr>
+      <p:grpSpPr>
+        <a:xfrm>
+          <a:off x="0" y="0"/>
+          <a:ext cx="0" cy="0"/>
+          <a:chOff x="0" y="0"/>
+          <a:chExt cx="0" cy="0"/>
+        </a:xfrm>
+      </p:grpSpPr>
+      <p:sp>
+        <p:nvSpPr>
+          <p:cNvPr id="2" name="Segnaposto immagine diapositiva 1"/>
+          <p:cNvSpPr>
+            <a:spLocks noGrp="1" noRot="1" noChangeAspect="1"/>
+          </p:cNvSpPr>
+          <p:nvPr>
+            <p:ph type="sldImg"/>
+          </p:nvPr>
+        </p:nvSpPr>
+        <p:spPr/>
+      </p:sp>
+      <p:sp>
+        <p:nvSpPr>
+          <p:cNvPr id="3" name="Segnaposto note 2"/>
+          <p:cNvSpPr>
+            <a:spLocks noGrp="1"/>
+          </p:cNvSpPr>
+          <p:nvPr>
+            <p:ph type="body" idx="1"/>
+          </p:nvPr>
+        </p:nvSpPr>
+        <p:spPr/>
+        <p:txBody>
+          <a:bodyPr rtlCol="0"/>
+          <a:lstStyle/>
+          <a:p>
+            <a:pPr rtl="0"/>
+            <a:endParaRPr lang="it-IT" dirty="0"/>
+          </a:p>
+        </p:txBody>
+      </p:sp>
+      <p:sp>
+        <p:nvSpPr>
+          <p:cNvPr id="4" name="Segnaposto numero diapositiva 3"/>
+          <p:cNvSpPr>
+            <a:spLocks noGrp="1"/>
+          </p:cNvSpPr>
+          <p:nvPr>
+            <p:ph type="sldNum" sz="quarter" idx="10"/>
+          </p:nvPr>
+        </p:nvSpPr>
+        <p:spPr/>
+        <p:txBody>
+          <a:bodyPr rtlCol="0"/>
+          <a:lstStyle/>
+          <a:p>
+            <a:pPr rtl="0"/>
+            <a:fld id="{284ECAD9-32EE-4091-BDA5-6BD15ACC5E58}" type="slidenum">
+              <a:rPr lang="it-IT" smtClean="0"/>
+              <a:t>12</a:t>
+            </a:fld>
+            <a:endParaRPr lang="it-IT" dirty="0"/>
+          </a:p>
+        </p:txBody>
+      </p:sp>
+    </p:spTree>
+    <p:extLst>
+      <p:ext uri="{BB962C8B-B14F-4D97-AF65-F5344CB8AC3E}">
+        <p14:creationId xmlns:p14="http://schemas.microsoft.com/office/powerpoint/2010/main" val="341484778"/>
+      </p:ext>
+    </p:extLst>
+  </p:cSld>
+  <p:clrMapOvr>
+    <a:masterClrMapping/>
+  </p:clrMapOvr>
+</p:notes>
+</file>
+
+<file path=ppt/notesSlides/notesSlide13.xml><?xml version="1.0" encoding="utf-8"?>
+<p:notes xmlns:a="http://schemas.openxmlformats.org/drawingml/2006/main" xmlns:r="http://schemas.openxmlformats.org/officeDocument/2006/relationships" xmlns:p="http://schemas.openxmlformats.org/presentationml/2006/main">
+  <p:cSld>
+    <p:spTree>
+      <p:nvGrpSpPr>
+        <p:cNvPr id="1" name=""/>
+        <p:cNvGrpSpPr/>
+        <p:nvPr/>
+      </p:nvGrpSpPr>
+      <p:grpSpPr>
+        <a:xfrm>
+          <a:off x="0" y="0"/>
+          <a:ext cx="0" cy="0"/>
+          <a:chOff x="0" y="0"/>
+          <a:chExt cx="0" cy="0"/>
+        </a:xfrm>
+      </p:grpSpPr>
+      <p:sp>
+        <p:nvSpPr>
+          <p:cNvPr id="2" name="Segnaposto immagine diapositiva 1"/>
+          <p:cNvSpPr>
+            <a:spLocks noGrp="1" noRot="1" noChangeAspect="1"/>
+          </p:cNvSpPr>
+          <p:nvPr>
+            <p:ph type="sldImg"/>
+          </p:nvPr>
+        </p:nvSpPr>
+        <p:spPr/>
+      </p:sp>
+      <p:sp>
+        <p:nvSpPr>
+          <p:cNvPr id="3" name="Segnaposto note 2"/>
+          <p:cNvSpPr>
+            <a:spLocks noGrp="1"/>
+          </p:cNvSpPr>
+          <p:nvPr>
+            <p:ph type="body" idx="1"/>
+          </p:nvPr>
+        </p:nvSpPr>
+        <p:spPr/>
+        <p:txBody>
+          <a:bodyPr rtlCol="0"/>
+          <a:lstStyle/>
+          <a:p>
+            <a:pPr rtl="0"/>
+            <a:endParaRPr lang="it-IT" dirty="0"/>
+          </a:p>
+        </p:txBody>
+      </p:sp>
+      <p:sp>
+        <p:nvSpPr>
+          <p:cNvPr id="4" name="Segnaposto numero diapositiva 3"/>
+          <p:cNvSpPr>
+            <a:spLocks noGrp="1"/>
+          </p:cNvSpPr>
+          <p:nvPr>
+            <p:ph type="sldNum" sz="quarter" idx="10"/>
+          </p:nvPr>
+        </p:nvSpPr>
+        <p:spPr/>
+        <p:txBody>
+          <a:bodyPr rtlCol="0"/>
+          <a:lstStyle/>
+          <a:p>
+            <a:pPr rtl="0"/>
+            <a:fld id="{284ECAD9-32EE-4091-BDA5-6BD15ACC5E58}" type="slidenum">
+              <a:rPr lang="it-IT" smtClean="0"/>
+              <a:t>13</a:t>
+            </a:fld>
+            <a:endParaRPr lang="it-IT" dirty="0"/>
+          </a:p>
+        </p:txBody>
+      </p:sp>
+    </p:spTree>
+    <p:extLst>
+      <p:ext uri="{BB962C8B-B14F-4D97-AF65-F5344CB8AC3E}">
+        <p14:creationId xmlns:p14="http://schemas.microsoft.com/office/powerpoint/2010/main" val="2382102743"/>
+      </p:ext>
+    </p:extLst>
+  </p:cSld>
+  <p:clrMapOvr>
+    <a:masterClrMapping/>
+  </p:clrMapOvr>
+</p:notes>
+</file>
+
+<file path=ppt/notesSlides/notesSlide14.xml><?xml version="1.0" encoding="utf-8"?>
+<p:notes xmlns:a="http://schemas.openxmlformats.org/drawingml/2006/main" xmlns:r="http://schemas.openxmlformats.org/officeDocument/2006/relationships" xmlns:p="http://schemas.openxmlformats.org/presentationml/2006/main">
+  <p:cSld>
+    <p:spTree>
+      <p:nvGrpSpPr>
+        <p:cNvPr id="1" name=""/>
+        <p:cNvGrpSpPr/>
+        <p:nvPr/>
+      </p:nvGrpSpPr>
+      <p:grpSpPr>
+        <a:xfrm>
+          <a:off x="0" y="0"/>
+          <a:ext cx="0" cy="0"/>
+          <a:chOff x="0" y="0"/>
+          <a:chExt cx="0" cy="0"/>
+        </a:xfrm>
+      </p:grpSpPr>
+      <p:sp>
+        <p:nvSpPr>
+          <p:cNvPr id="2" name="Segnaposto immagine diapositiva 1"/>
+          <p:cNvSpPr>
+            <a:spLocks noGrp="1" noRot="1" noChangeAspect="1"/>
+          </p:cNvSpPr>
+          <p:nvPr>
+            <p:ph type="sldImg"/>
+          </p:nvPr>
+        </p:nvSpPr>
+        <p:spPr/>
+      </p:sp>
+      <p:sp>
+        <p:nvSpPr>
+          <p:cNvPr id="3" name="Segnaposto note 2"/>
+          <p:cNvSpPr>
+            <a:spLocks noGrp="1"/>
+          </p:cNvSpPr>
+          <p:nvPr>
+            <p:ph type="body" idx="1"/>
+          </p:nvPr>
+        </p:nvSpPr>
+        <p:spPr/>
+        <p:txBody>
+          <a:bodyPr rtlCol="0"/>
+          <a:lstStyle/>
+          <a:p>
+            <a:pPr rtl="0"/>
+            <a:endParaRPr lang="it-IT" dirty="0"/>
+          </a:p>
+        </p:txBody>
+      </p:sp>
+      <p:sp>
+        <p:nvSpPr>
+          <p:cNvPr id="4" name="Segnaposto numero diapositiva 3"/>
+          <p:cNvSpPr>
+            <a:spLocks noGrp="1"/>
+          </p:cNvSpPr>
+          <p:nvPr>
+            <p:ph type="sldNum" sz="quarter" idx="10"/>
+          </p:nvPr>
+        </p:nvSpPr>
+        <p:spPr/>
+        <p:txBody>
+          <a:bodyPr rtlCol="0"/>
+          <a:lstStyle/>
+          <a:p>
+            <a:pPr rtl="0"/>
+            <a:fld id="{284ECAD9-32EE-4091-BDA5-6BD15ACC5E58}" type="slidenum">
+              <a:rPr lang="it-IT" smtClean="0"/>
+              <a:t>14</a:t>
+            </a:fld>
+            <a:endParaRPr lang="it-IT" dirty="0"/>
+          </a:p>
+        </p:txBody>
+      </p:sp>
+    </p:spTree>
+    <p:extLst>
+      <p:ext uri="{BB962C8B-B14F-4D97-AF65-F5344CB8AC3E}">
+        <p14:creationId xmlns:p14="http://schemas.microsoft.com/office/powerpoint/2010/main" val="1911008965"/>
+      </p:ext>
+    </p:extLst>
+  </p:cSld>
+  <p:clrMapOvr>
+    <a:masterClrMapping/>
+  </p:clrMapOvr>
+</p:notes>
+</file>
+
 <file path=ppt/notesSlides/notesSlide2.xml><?xml version="1.0" encoding="utf-8"?>
 <p:notes xmlns:a="http://schemas.openxmlformats.org/drawingml/2006/main" xmlns:r="http://schemas.openxmlformats.org/officeDocument/2006/relationships" xmlns:p="http://schemas.openxmlformats.org/presentationml/2006/main">
   <p:cSld>
@@ -1700,7 +1961,7 @@
             <a:pPr rtl="0"/>
             <a:fld id="{BC5A5791-EFA9-42A2-8E0D-DBC7A027EB39}" type="datetime1">
               <a:rPr lang="it-IT" noProof="0" smtClean="0"/>
-              <a:t>11/11/2022</a:t>
+              <a:t>18/11/2022</a:t>
             </a:fld>
             <a:endParaRPr lang="it-IT" noProof="0" dirty="0"/>
           </a:p>
@@ -2328,7 +2589,7 @@
             <a:pPr rtl="0"/>
             <a:fld id="{FF17C169-DBE1-4B6A-9921-1E108A1C6C42}" type="datetime1">
               <a:rPr lang="it-IT" noProof="0" smtClean="0"/>
-              <a:t>11/11/2022</a:t>
+              <a:t>18/11/2022</a:t>
             </a:fld>
             <a:endParaRPr lang="it-IT" noProof="0" dirty="0"/>
           </a:p>
@@ -2685,7 +2946,7 @@
             <a:pPr rtl="0"/>
             <a:fld id="{6C0ABBAF-B24C-4448-B75C-ADB9350121F9}" type="datetime1">
               <a:rPr lang="it-IT" noProof="0" smtClean="0"/>
-              <a:t>11/11/2022</a:t>
+              <a:t>18/11/2022</a:t>
             </a:fld>
             <a:endParaRPr lang="it-IT" noProof="0" dirty="0"/>
           </a:p>
@@ -3084,7 +3345,7 @@
             <a:pPr rtl="0"/>
             <a:fld id="{26E56894-810F-46F6-9A4E-7CB650138CD2}" type="datetime1">
               <a:rPr lang="it-IT" noProof="0" smtClean="0"/>
-              <a:t>11/11/2022</a:t>
+              <a:t>18/11/2022</a:t>
             </a:fld>
             <a:endParaRPr lang="it-IT" noProof="0" dirty="0"/>
           </a:p>
@@ -3567,7 +3828,7 @@
             <a:pPr rtl="0"/>
             <a:fld id="{6BDF9918-2BB5-43D7-98E9-1FB3954C3638}" type="datetime1">
               <a:rPr lang="it-IT" noProof="0" smtClean="0"/>
-              <a:t>11/11/2022</a:t>
+              <a:t>18/11/2022</a:t>
             </a:fld>
             <a:endParaRPr lang="it-IT" noProof="0" dirty="0"/>
           </a:p>
@@ -3958,7 +4219,7 @@
             <a:pPr rtl="0"/>
             <a:fld id="{983F2180-7340-4006-8F9F-3B15285D3035}" type="datetime1">
               <a:rPr lang="it-IT" noProof="0" smtClean="0"/>
-              <a:t>11/11/2022</a:t>
+              <a:t>18/11/2022</a:t>
             </a:fld>
             <a:endParaRPr lang="it-IT" noProof="0" dirty="0"/>
           </a:p>
@@ -4326,7 +4587,7 @@
             <a:pPr rtl="0"/>
             <a:fld id="{47C567FE-B98A-4D3F-9213-316EA9EC55A5}" type="datetime1">
               <a:rPr lang="it-IT" noProof="0" smtClean="0"/>
-              <a:t>11/11/2022</a:t>
+              <a:t>18/11/2022</a:t>
             </a:fld>
             <a:endParaRPr lang="it-IT" noProof="0" dirty="0"/>
           </a:p>
@@ -4819,7 +5080,7 @@
             <a:pPr rtl="0"/>
             <a:fld id="{BC922104-62E9-446F-9FB1-A32B08927891}" type="datetime1">
               <a:rPr lang="it-IT" noProof="0" smtClean="0"/>
-              <a:t>11/11/2022</a:t>
+              <a:t>18/11/2022</a:t>
             </a:fld>
             <a:endParaRPr lang="it-IT" noProof="0" dirty="0"/>
           </a:p>
@@ -5319,7 +5580,7 @@
             <a:pPr rtl="0"/>
             <a:fld id="{192B49F1-2FC8-466C-ABE0-4929E08403C1}" type="datetime1">
               <a:rPr lang="it-IT" noProof="0" smtClean="0"/>
-              <a:t>11/11/2022</a:t>
+              <a:t>18/11/2022</a:t>
             </a:fld>
             <a:endParaRPr lang="it-IT" noProof="0" dirty="0"/>
           </a:p>
@@ -5756,7 +6017,7 @@
             <a:pPr rtl="0"/>
             <a:fld id="{D669DC07-792B-4D17-B0C3-BB835168107E}" type="datetime1">
               <a:rPr lang="it-IT" noProof="0" smtClean="0"/>
-              <a:t>11/11/2022</a:t>
+              <a:t>18/11/2022</a:t>
             </a:fld>
             <a:endParaRPr lang="it-IT" noProof="0" dirty="0"/>
           </a:p>
@@ -6013,7 +6274,7 @@
             <a:pPr rtl="0"/>
             <a:fld id="{C95873E1-B6E7-4F22-ACBC-2B4E759526F9}" type="datetime1">
               <a:rPr lang="it-IT" noProof="0" smtClean="0"/>
-              <a:t>11/11/2022</a:t>
+              <a:t>18/11/2022</a:t>
             </a:fld>
             <a:endParaRPr lang="it-IT" noProof="0" dirty="0"/>
           </a:p>
@@ -6246,7 +6507,7 @@
             <a:pPr rtl="0"/>
             <a:fld id="{EDF35B73-1E84-4E1D-9C62-04B6DA1DCD89}" type="datetime1">
               <a:rPr lang="it-IT" noProof="0" smtClean="0"/>
-              <a:t>11/11/2022</a:t>
+              <a:t>18/11/2022</a:t>
             </a:fld>
             <a:endParaRPr lang="it-IT" noProof="0" dirty="0"/>
           </a:p>
@@ -6654,7 +6915,7 @@
             <a:pPr rtl="0"/>
             <a:fld id="{EF217D74-4249-45DE-AFC1-DB41000B186F}" type="datetime1">
               <a:rPr lang="it-IT" noProof="0" smtClean="0"/>
-              <a:t>11/11/2022</a:t>
+              <a:t>18/11/2022</a:t>
             </a:fld>
             <a:endParaRPr lang="it-IT" noProof="0" dirty="0"/>
           </a:p>
@@ -6898,7 +7159,7 @@
             <a:pPr rtl="0"/>
             <a:fld id="{02821AFD-43C1-409E-AABC-CA19CBFB6E3C}" type="datetime1">
               <a:rPr lang="it-IT" noProof="0" smtClean="0"/>
-              <a:t>11/11/2022</a:t>
+              <a:t>18/11/2022</a:t>
             </a:fld>
             <a:endParaRPr lang="it-IT" noProof="0" dirty="0"/>
           </a:p>
@@ -7098,7 +7359,7 @@
             <a:pPr rtl="0"/>
             <a:fld id="{25D5A028-43A2-4639-BEEA-82C2B46D2F75}" type="datetime1">
               <a:rPr lang="it-IT" noProof="0" smtClean="0"/>
-              <a:t>11/11/2022</a:t>
+              <a:t>18/11/2022</a:t>
             </a:fld>
             <a:endParaRPr lang="it-IT" noProof="0" dirty="0"/>
           </a:p>
@@ -7558,7 +7819,7 @@
             <a:pPr rtl="0"/>
             <a:fld id="{0AC1AF47-3649-4D70-8624-44F2D47949BF}" type="datetime1">
               <a:rPr lang="it-IT" noProof="0" smtClean="0"/>
-              <a:t>11/11/2022</a:t>
+              <a:t>18/11/2022</a:t>
             </a:fld>
             <a:endParaRPr lang="it-IT" noProof="0" dirty="0"/>
           </a:p>
@@ -8142,7 +8403,7 @@
             <a:pPr rtl="0"/>
             <a:fld id="{0C86549E-7F36-460D-B45B-E31862ACF4DC}" type="datetime1">
               <a:rPr lang="it-IT" noProof="0" smtClean="0"/>
-              <a:t>11/11/2022</a:t>
+              <a:t>18/11/2022</a:t>
             </a:fld>
             <a:endParaRPr lang="it-IT" noProof="0" dirty="0"/>
           </a:p>
@@ -8546,7 +8807,7 @@
             <a:pPr rtl="0"/>
             <a:fld id="{5AD476CA-C764-4FAD-8146-5EA1029A9E33}" type="datetime1">
               <a:rPr lang="it-IT" noProof="0" smtClean="0"/>
-              <a:t>11/11/2022</a:t>
+              <a:t>18/11/2022</a:t>
             </a:fld>
             <a:endParaRPr lang="it-IT" noProof="0" dirty="0"/>
           </a:p>
@@ -8689,7 +8950,7 @@
             <a:pPr rtl="0"/>
             <a:fld id="{8718CE71-08A2-40CC-B75F-5DA9EAC27385}" type="datetime1">
               <a:rPr lang="it-IT" noProof="0" smtClean="0"/>
-              <a:t>11/11/2022</a:t>
+              <a:t>18/11/2022</a:t>
             </a:fld>
             <a:endParaRPr lang="it-IT" noProof="0" dirty="0"/>
           </a:p>
@@ -8881,7 +9142,7 @@
             <a:pPr rtl="0"/>
             <a:fld id="{2F6EAE58-4589-466E-80D1-72C9CC21B379}" type="datetime1">
               <a:rPr lang="it-IT" noProof="0" smtClean="0"/>
-              <a:t>11/11/2022</a:t>
+              <a:t>18/11/2022</a:t>
             </a:fld>
             <a:endParaRPr lang="it-IT" noProof="0" dirty="0"/>
           </a:p>
@@ -9197,7 +9458,7 @@
             <a:pPr rtl="0"/>
             <a:fld id="{415EA518-E098-4533-A7FE-3A70CD273BA1}" type="datetime1">
               <a:rPr lang="it-IT" noProof="0" smtClean="0"/>
-              <a:t>11/11/2022</a:t>
+              <a:t>18/11/2022</a:t>
             </a:fld>
             <a:endParaRPr lang="it-IT" noProof="0" dirty="0"/>
           </a:p>
@@ -10463,6 +10724,41 @@
           </a:ln>
         </p:spPr>
       </p:pic>
+      <p:sp>
+        <p:nvSpPr>
+          <p:cNvPr id="2" name="CasellaDiTesto 1">
+            <a:extLst>
+              <a:ext uri="{FF2B5EF4-FFF2-40B4-BE49-F238E27FC236}">
+                <a16:creationId xmlns:a16="http://schemas.microsoft.com/office/drawing/2014/main" id="{5690DFC9-C82F-8EBE-40FC-64B9E9A391CB}"/>
+              </a:ext>
+            </a:extLst>
+          </p:cNvPr>
+          <p:cNvSpPr txBox="1"/>
+          <p:nvPr/>
+        </p:nvSpPr>
+        <p:spPr>
+          <a:xfrm>
+            <a:off x="3847891" y="5783496"/>
+            <a:ext cx="4788110" cy="307777"/>
+          </a:xfrm>
+          <a:prstGeom prst="rect">
+            <a:avLst/>
+          </a:prstGeom>
+          <a:noFill/>
+        </p:spPr>
+        <p:txBody>
+          <a:bodyPr wrap="square">
+            <a:spAutoFit/>
+          </a:bodyPr>
+          <a:lstStyle/>
+          <a:p>
+            <a:r>
+              <a:rPr lang="it-IT" sz="1400" dirty="0"/>
+              <a:t>Traduzione della sezione di movimento e uscita del file di input</a:t>
+            </a:r>
+          </a:p>
+        </p:txBody>
+      </p:sp>
     </p:spTree>
     <p:extLst>
       <p:ext uri="{BB962C8B-B14F-4D97-AF65-F5344CB8AC3E}">
@@ -10539,7 +10835,7 @@
                   </a:schemeClr>
                 </a:solidFill>
               </a:rPr>
-              <a:t>Tecnologie utilizzate</a:t>
+              <a:t>Esempi di lavorazioni</a:t>
             </a:r>
             <a:endParaRPr lang="it-IT" dirty="0"/>
           </a:p>
@@ -10635,6 +10931,609 @@
           </a:p>
         </p:txBody>
       </p:sp>
+      <p:pic>
+        <p:nvPicPr>
+          <p:cNvPr id="5" name="Segnaposto contenuto 4">
+            <a:extLst>
+              <a:ext uri="{FF2B5EF4-FFF2-40B4-BE49-F238E27FC236}">
+                <a16:creationId xmlns:a16="http://schemas.microsoft.com/office/drawing/2014/main" id="{6D7F5167-21C4-A4F2-5F5D-5FC481391EF0}"/>
+              </a:ext>
+            </a:extLst>
+          </p:cNvPr>
+          <p:cNvPicPr>
+            <a:picLocks noGrp="1" noChangeAspect="1"/>
+          </p:cNvPicPr>
+          <p:nvPr>
+            <p:ph idx="1"/>
+          </p:nvPr>
+        </p:nvPicPr>
+        <p:blipFill>
+          <a:blip r:embed="rId5"/>
+          <a:stretch>
+            <a:fillRect/>
+          </a:stretch>
+        </p:blipFill>
+        <p:spPr>
+          <a:xfrm>
+            <a:off x="1403429" y="1737360"/>
+            <a:ext cx="9446101" cy="4131628"/>
+          </a:xfrm>
+        </p:spPr>
+      </p:pic>
+    </p:spTree>
+    <p:extLst>
+      <p:ext uri="{BB962C8B-B14F-4D97-AF65-F5344CB8AC3E}">
+        <p14:creationId xmlns:p14="http://schemas.microsoft.com/office/powerpoint/2010/main" val="1318820384"/>
+      </p:ext>
+    </p:extLst>
+  </p:cSld>
+  <p:clrMapOvr>
+    <a:masterClrMapping/>
+  </p:clrMapOvr>
+</p:sld>
+</file>
+
+<file path=ppt/slides/slide12.xml><?xml version="1.0" encoding="utf-8"?>
+<p:sld xmlns:a="http://schemas.openxmlformats.org/drawingml/2006/main" xmlns:r="http://schemas.openxmlformats.org/officeDocument/2006/relationships" xmlns:p="http://schemas.openxmlformats.org/presentationml/2006/main">
+  <p:cSld>
+    <p:bg>
+      <p:bgPr>
+        <a:solidFill>
+          <a:schemeClr val="bg1"/>
+        </a:solidFill>
+        <a:effectLst/>
+      </p:bgPr>
+    </p:bg>
+    <p:spTree>
+      <p:nvGrpSpPr>
+        <p:cNvPr id="1" name=""/>
+        <p:cNvGrpSpPr/>
+        <p:nvPr/>
+      </p:nvGrpSpPr>
+      <p:grpSpPr>
+        <a:xfrm>
+          <a:off x="0" y="0"/>
+          <a:ext cx="0" cy="0"/>
+          <a:chOff x="0" y="0"/>
+          <a:chExt cx="0" cy="0"/>
+        </a:xfrm>
+      </p:grpSpPr>
+      <p:sp>
+        <p:nvSpPr>
+          <p:cNvPr id="6" name="Titolo 5">
+            <a:extLst>
+              <a:ext uri="{FF2B5EF4-FFF2-40B4-BE49-F238E27FC236}">
+                <a16:creationId xmlns:a16="http://schemas.microsoft.com/office/drawing/2014/main" id="{CE09A200-4838-4284-BD1E-19701CABB5FE}"/>
+              </a:ext>
+            </a:extLst>
+          </p:cNvPr>
+          <p:cNvSpPr>
+            <a:spLocks noGrp="1"/>
+          </p:cNvSpPr>
+          <p:nvPr>
+            <p:ph type="title"/>
+          </p:nvPr>
+        </p:nvSpPr>
+        <p:spPr>
+          <a:xfrm>
+            <a:off x="1097280" y="286603"/>
+            <a:ext cx="10058400" cy="1450757"/>
+          </a:xfrm>
+        </p:spPr>
+        <p:txBody>
+          <a:bodyPr rtlCol="0">
+            <a:normAutofit/>
+          </a:bodyPr>
+          <a:lstStyle/>
+          <a:p>
+            <a:pPr rtl="0"/>
+            <a:r>
+              <a:rPr lang="it-IT" sz="4800" dirty="0">
+                <a:solidFill>
+                  <a:schemeClr val="tx1">
+                    <a:lumMod val="75000"/>
+                    <a:lumOff val="25000"/>
+                  </a:schemeClr>
+                </a:solidFill>
+              </a:rPr>
+              <a:t>Esempi di lavorazioni</a:t>
+            </a:r>
+            <a:endParaRPr lang="it-IT" dirty="0"/>
+          </a:p>
+        </p:txBody>
+      </p:sp>
+      <p:pic>
+        <p:nvPicPr>
+          <p:cNvPr id="4" name="Elemento grafico 3">
+            <a:extLst>
+              <a:ext uri="{FF2B5EF4-FFF2-40B4-BE49-F238E27FC236}">
+                <a16:creationId xmlns:a16="http://schemas.microsoft.com/office/drawing/2014/main" id="{ED0A95A1-BC85-4809-B935-6A9B3C054422}"/>
+              </a:ext>
+            </a:extLst>
+          </p:cNvPr>
+          <p:cNvPicPr>
+            <a:picLocks noChangeAspect="1"/>
+          </p:cNvPicPr>
+          <p:nvPr/>
+        </p:nvPicPr>
+        <p:blipFill>
+          <a:blip r:embed="rId3" cstate="print">
+            <a:extLst>
+              <a:ext uri="{28A0092B-C50C-407E-A947-70E740481C1C}">
+                <a14:useLocalDpi xmlns:a14="http://schemas.microsoft.com/office/drawing/2010/main" val="0"/>
+              </a:ext>
+              <a:ext uri="{96DAC541-7B7A-43D3-8B79-37D633B846F1}">
+                <asvg:svgBlip xmlns:asvg="http://schemas.microsoft.com/office/drawing/2016/SVG/main" r:embed="rId4"/>
+              </a:ext>
+            </a:extLst>
+          </a:blip>
+          <a:stretch>
+            <a:fillRect/>
+          </a:stretch>
+        </p:blipFill>
+        <p:spPr>
+          <a:xfrm>
+            <a:off x="207095" y="6043750"/>
+            <a:ext cx="1770209" cy="700341"/>
+          </a:xfrm>
+          <a:prstGeom prst="rect">
+            <a:avLst/>
+          </a:prstGeom>
+        </p:spPr>
+      </p:pic>
+      <p:sp>
+        <p:nvSpPr>
+          <p:cNvPr id="10" name="Connettore 9">
+            <a:extLst>
+              <a:ext uri="{FF2B5EF4-FFF2-40B4-BE49-F238E27FC236}">
+                <a16:creationId xmlns:a16="http://schemas.microsoft.com/office/drawing/2014/main" id="{7DA3C5E2-1B7C-406E-9A80-B7F344044586}"/>
+              </a:ext>
+            </a:extLst>
+          </p:cNvPr>
+          <p:cNvSpPr/>
+          <p:nvPr/>
+        </p:nvSpPr>
+        <p:spPr>
+          <a:xfrm>
+            <a:off x="11455401" y="6273800"/>
+            <a:ext cx="512910" cy="470291"/>
+          </a:xfrm>
+          <a:prstGeom prst="flowChartConnector">
+            <a:avLst/>
+          </a:prstGeom>
+        </p:spPr>
+        <p:style>
+          <a:lnRef idx="2">
+            <a:schemeClr val="accent1">
+              <a:shade val="50000"/>
+            </a:schemeClr>
+          </a:lnRef>
+          <a:fillRef idx="1">
+            <a:schemeClr val="accent1"/>
+          </a:fillRef>
+          <a:effectRef idx="0">
+            <a:schemeClr val="accent1"/>
+          </a:effectRef>
+          <a:fontRef idx="minor">
+            <a:schemeClr val="lt1"/>
+          </a:fontRef>
+        </p:style>
+        <p:txBody>
+          <a:bodyPr rtlCol="0" anchor="ctr"/>
+          <a:lstStyle/>
+          <a:p>
+            <a:pPr algn="ctr"/>
+            <a:fld id="{3A98EE3D-8CD1-4C3F-BD1C-C98C9596463C}" type="slidenum">
+              <a:rPr lang="it-IT" sz="1200" b="1"/>
+              <a:pPr algn="ctr"/>
+              <a:t>12</a:t>
+            </a:fld>
+            <a:endParaRPr lang="it-IT" b="1" dirty="0"/>
+          </a:p>
+        </p:txBody>
+      </p:sp>
+      <p:pic>
+        <p:nvPicPr>
+          <p:cNvPr id="13" name="Segnaposto contenuto 12">
+            <a:extLst>
+              <a:ext uri="{FF2B5EF4-FFF2-40B4-BE49-F238E27FC236}">
+                <a16:creationId xmlns:a16="http://schemas.microsoft.com/office/drawing/2014/main" id="{B87424F4-1DAE-9ABF-B7D6-ACA8884C4C79}"/>
+              </a:ext>
+            </a:extLst>
+          </p:cNvPr>
+          <p:cNvPicPr>
+            <a:picLocks noGrp="1" noChangeAspect="1"/>
+          </p:cNvPicPr>
+          <p:nvPr>
+            <p:ph idx="1"/>
+          </p:nvPr>
+        </p:nvPicPr>
+        <p:blipFill>
+          <a:blip r:embed="rId5"/>
+          <a:stretch>
+            <a:fillRect/>
+          </a:stretch>
+        </p:blipFill>
+        <p:spPr>
+          <a:xfrm>
+            <a:off x="1351241" y="1737359"/>
+            <a:ext cx="9352722" cy="4090785"/>
+          </a:xfrm>
+        </p:spPr>
+      </p:pic>
+    </p:spTree>
+    <p:extLst>
+      <p:ext uri="{BB962C8B-B14F-4D97-AF65-F5344CB8AC3E}">
+        <p14:creationId xmlns:p14="http://schemas.microsoft.com/office/powerpoint/2010/main" val="2597718632"/>
+      </p:ext>
+    </p:extLst>
+  </p:cSld>
+  <p:clrMapOvr>
+    <a:masterClrMapping/>
+  </p:clrMapOvr>
+</p:sld>
+</file>
+
+<file path=ppt/slides/slide13.xml><?xml version="1.0" encoding="utf-8"?>
+<p:sld xmlns:a="http://schemas.openxmlformats.org/drawingml/2006/main" xmlns:r="http://schemas.openxmlformats.org/officeDocument/2006/relationships" xmlns:p="http://schemas.openxmlformats.org/presentationml/2006/main">
+  <p:cSld>
+    <p:bg>
+      <p:bgPr>
+        <a:solidFill>
+          <a:schemeClr val="bg1"/>
+        </a:solidFill>
+        <a:effectLst/>
+      </p:bgPr>
+    </p:bg>
+    <p:spTree>
+      <p:nvGrpSpPr>
+        <p:cNvPr id="1" name=""/>
+        <p:cNvGrpSpPr/>
+        <p:nvPr/>
+      </p:nvGrpSpPr>
+      <p:grpSpPr>
+        <a:xfrm>
+          <a:off x="0" y="0"/>
+          <a:ext cx="0" cy="0"/>
+          <a:chOff x="0" y="0"/>
+          <a:chExt cx="0" cy="0"/>
+        </a:xfrm>
+      </p:grpSpPr>
+      <p:sp>
+        <p:nvSpPr>
+          <p:cNvPr id="6" name="Titolo 5">
+            <a:extLst>
+              <a:ext uri="{FF2B5EF4-FFF2-40B4-BE49-F238E27FC236}">
+                <a16:creationId xmlns:a16="http://schemas.microsoft.com/office/drawing/2014/main" id="{CE09A200-4838-4284-BD1E-19701CABB5FE}"/>
+              </a:ext>
+            </a:extLst>
+          </p:cNvPr>
+          <p:cNvSpPr>
+            <a:spLocks noGrp="1"/>
+          </p:cNvSpPr>
+          <p:nvPr>
+            <p:ph type="title"/>
+          </p:nvPr>
+        </p:nvSpPr>
+        <p:spPr>
+          <a:xfrm>
+            <a:off x="1097280" y="286603"/>
+            <a:ext cx="10058400" cy="1450757"/>
+          </a:xfrm>
+        </p:spPr>
+        <p:txBody>
+          <a:bodyPr rtlCol="0">
+            <a:normAutofit/>
+          </a:bodyPr>
+          <a:lstStyle/>
+          <a:p>
+            <a:pPr rtl="0"/>
+            <a:r>
+              <a:rPr lang="it-IT" sz="4800" dirty="0">
+                <a:solidFill>
+                  <a:schemeClr val="tx1">
+                    <a:lumMod val="75000"/>
+                    <a:lumOff val="25000"/>
+                  </a:schemeClr>
+                </a:solidFill>
+              </a:rPr>
+              <a:t>Esempi di lavorazioni</a:t>
+            </a:r>
+            <a:endParaRPr lang="it-IT" dirty="0"/>
+          </a:p>
+        </p:txBody>
+      </p:sp>
+      <p:pic>
+        <p:nvPicPr>
+          <p:cNvPr id="4" name="Elemento grafico 3">
+            <a:extLst>
+              <a:ext uri="{FF2B5EF4-FFF2-40B4-BE49-F238E27FC236}">
+                <a16:creationId xmlns:a16="http://schemas.microsoft.com/office/drawing/2014/main" id="{ED0A95A1-BC85-4809-B935-6A9B3C054422}"/>
+              </a:ext>
+            </a:extLst>
+          </p:cNvPr>
+          <p:cNvPicPr>
+            <a:picLocks noChangeAspect="1"/>
+          </p:cNvPicPr>
+          <p:nvPr/>
+        </p:nvPicPr>
+        <p:blipFill>
+          <a:blip r:embed="rId3" cstate="print">
+            <a:extLst>
+              <a:ext uri="{28A0092B-C50C-407E-A947-70E740481C1C}">
+                <a14:useLocalDpi xmlns:a14="http://schemas.microsoft.com/office/drawing/2010/main" val="0"/>
+              </a:ext>
+              <a:ext uri="{96DAC541-7B7A-43D3-8B79-37D633B846F1}">
+                <asvg:svgBlip xmlns:asvg="http://schemas.microsoft.com/office/drawing/2016/SVG/main" r:embed="rId4"/>
+              </a:ext>
+            </a:extLst>
+          </a:blip>
+          <a:stretch>
+            <a:fillRect/>
+          </a:stretch>
+        </p:blipFill>
+        <p:spPr>
+          <a:xfrm>
+            <a:off x="207095" y="6043750"/>
+            <a:ext cx="1770209" cy="700341"/>
+          </a:xfrm>
+          <a:prstGeom prst="rect">
+            <a:avLst/>
+          </a:prstGeom>
+        </p:spPr>
+      </p:pic>
+      <p:sp>
+        <p:nvSpPr>
+          <p:cNvPr id="10" name="Connettore 9">
+            <a:extLst>
+              <a:ext uri="{FF2B5EF4-FFF2-40B4-BE49-F238E27FC236}">
+                <a16:creationId xmlns:a16="http://schemas.microsoft.com/office/drawing/2014/main" id="{7DA3C5E2-1B7C-406E-9A80-B7F344044586}"/>
+              </a:ext>
+            </a:extLst>
+          </p:cNvPr>
+          <p:cNvSpPr/>
+          <p:nvPr/>
+        </p:nvSpPr>
+        <p:spPr>
+          <a:xfrm>
+            <a:off x="11455401" y="6273800"/>
+            <a:ext cx="512910" cy="470291"/>
+          </a:xfrm>
+          <a:prstGeom prst="flowChartConnector">
+            <a:avLst/>
+          </a:prstGeom>
+        </p:spPr>
+        <p:style>
+          <a:lnRef idx="2">
+            <a:schemeClr val="accent1">
+              <a:shade val="50000"/>
+            </a:schemeClr>
+          </a:lnRef>
+          <a:fillRef idx="1">
+            <a:schemeClr val="accent1"/>
+          </a:fillRef>
+          <a:effectRef idx="0">
+            <a:schemeClr val="accent1"/>
+          </a:effectRef>
+          <a:fontRef idx="minor">
+            <a:schemeClr val="lt1"/>
+          </a:fontRef>
+        </p:style>
+        <p:txBody>
+          <a:bodyPr rtlCol="0" anchor="ctr"/>
+          <a:lstStyle/>
+          <a:p>
+            <a:pPr algn="ctr"/>
+            <a:fld id="{3A98EE3D-8CD1-4C3F-BD1C-C98C9596463C}" type="slidenum">
+              <a:rPr lang="it-IT" sz="1200" b="1"/>
+              <a:pPr algn="ctr"/>
+              <a:t>13</a:t>
+            </a:fld>
+            <a:endParaRPr lang="it-IT" b="1" dirty="0"/>
+          </a:p>
+        </p:txBody>
+      </p:sp>
+      <p:pic>
+        <p:nvPicPr>
+          <p:cNvPr id="7" name="Segnaposto contenuto 6">
+            <a:extLst>
+              <a:ext uri="{FF2B5EF4-FFF2-40B4-BE49-F238E27FC236}">
+                <a16:creationId xmlns:a16="http://schemas.microsoft.com/office/drawing/2014/main" id="{2C61B33F-85AF-A52E-F52A-3BB95C791008}"/>
+              </a:ext>
+            </a:extLst>
+          </p:cNvPr>
+          <p:cNvPicPr>
+            <a:picLocks noGrp="1" noChangeAspect="1"/>
+          </p:cNvPicPr>
+          <p:nvPr>
+            <p:ph idx="1"/>
+          </p:nvPr>
+        </p:nvPicPr>
+        <p:blipFill>
+          <a:blip r:embed="rId5"/>
+          <a:stretch>
+            <a:fillRect/>
+          </a:stretch>
+        </p:blipFill>
+        <p:spPr>
+          <a:xfrm>
+            <a:off x="1372949" y="1737360"/>
+            <a:ext cx="9446101" cy="4131628"/>
+          </a:xfrm>
+        </p:spPr>
+      </p:pic>
+    </p:spTree>
+    <p:extLst>
+      <p:ext uri="{BB962C8B-B14F-4D97-AF65-F5344CB8AC3E}">
+        <p14:creationId xmlns:p14="http://schemas.microsoft.com/office/powerpoint/2010/main" val="2505731737"/>
+      </p:ext>
+    </p:extLst>
+  </p:cSld>
+  <p:clrMapOvr>
+    <a:masterClrMapping/>
+  </p:clrMapOvr>
+</p:sld>
+</file>
+
+<file path=ppt/slides/slide14.xml><?xml version="1.0" encoding="utf-8"?>
+<p:sld xmlns:a="http://schemas.openxmlformats.org/drawingml/2006/main" xmlns:r="http://schemas.openxmlformats.org/officeDocument/2006/relationships" xmlns:p="http://schemas.openxmlformats.org/presentationml/2006/main">
+  <p:cSld>
+    <p:bg>
+      <p:bgPr>
+        <a:solidFill>
+          <a:schemeClr val="bg1"/>
+        </a:solidFill>
+        <a:effectLst/>
+      </p:bgPr>
+    </p:bg>
+    <p:spTree>
+      <p:nvGrpSpPr>
+        <p:cNvPr id="1" name=""/>
+        <p:cNvGrpSpPr/>
+        <p:nvPr/>
+      </p:nvGrpSpPr>
+      <p:grpSpPr>
+        <a:xfrm>
+          <a:off x="0" y="0"/>
+          <a:ext cx="0" cy="0"/>
+          <a:chOff x="0" y="0"/>
+          <a:chExt cx="0" cy="0"/>
+        </a:xfrm>
+      </p:grpSpPr>
+      <p:sp>
+        <p:nvSpPr>
+          <p:cNvPr id="6" name="Titolo 5">
+            <a:extLst>
+              <a:ext uri="{FF2B5EF4-FFF2-40B4-BE49-F238E27FC236}">
+                <a16:creationId xmlns:a16="http://schemas.microsoft.com/office/drawing/2014/main" id="{CE09A200-4838-4284-BD1E-19701CABB5FE}"/>
+              </a:ext>
+            </a:extLst>
+          </p:cNvPr>
+          <p:cNvSpPr>
+            <a:spLocks noGrp="1"/>
+          </p:cNvSpPr>
+          <p:nvPr>
+            <p:ph type="title"/>
+          </p:nvPr>
+        </p:nvSpPr>
+        <p:spPr>
+          <a:xfrm>
+            <a:off x="1097280" y="286603"/>
+            <a:ext cx="10058400" cy="1450757"/>
+          </a:xfrm>
+        </p:spPr>
+        <p:txBody>
+          <a:bodyPr rtlCol="0">
+            <a:normAutofit/>
+          </a:bodyPr>
+          <a:lstStyle/>
+          <a:p>
+            <a:pPr rtl="0"/>
+            <a:r>
+              <a:rPr lang="it-IT" sz="4800" dirty="0">
+                <a:solidFill>
+                  <a:schemeClr val="tx1">
+                    <a:lumMod val="75000"/>
+                    <a:lumOff val="25000"/>
+                  </a:schemeClr>
+                </a:solidFill>
+              </a:rPr>
+              <a:t>Tecnologie utilizzate</a:t>
+            </a:r>
+            <a:endParaRPr lang="it-IT" dirty="0"/>
+          </a:p>
+        </p:txBody>
+      </p:sp>
+      <p:pic>
+        <p:nvPicPr>
+          <p:cNvPr id="4" name="Elemento grafico 3">
+            <a:extLst>
+              <a:ext uri="{FF2B5EF4-FFF2-40B4-BE49-F238E27FC236}">
+                <a16:creationId xmlns:a16="http://schemas.microsoft.com/office/drawing/2014/main" id="{ED0A95A1-BC85-4809-B935-6A9B3C054422}"/>
+              </a:ext>
+            </a:extLst>
+          </p:cNvPr>
+          <p:cNvPicPr>
+            <a:picLocks noChangeAspect="1"/>
+          </p:cNvPicPr>
+          <p:nvPr/>
+        </p:nvPicPr>
+        <p:blipFill>
+          <a:blip r:embed="rId3" cstate="print">
+            <a:extLst>
+              <a:ext uri="{28A0092B-C50C-407E-A947-70E740481C1C}">
+                <a14:useLocalDpi xmlns:a14="http://schemas.microsoft.com/office/drawing/2010/main" val="0"/>
+              </a:ext>
+              <a:ext uri="{96DAC541-7B7A-43D3-8B79-37D633B846F1}">
+                <asvg:svgBlip xmlns:asvg="http://schemas.microsoft.com/office/drawing/2016/SVG/main" r:embed="rId4"/>
+              </a:ext>
+            </a:extLst>
+          </a:blip>
+          <a:stretch>
+            <a:fillRect/>
+          </a:stretch>
+        </p:blipFill>
+        <p:spPr>
+          <a:xfrm>
+            <a:off x="207095" y="6043750"/>
+            <a:ext cx="1770209" cy="700341"/>
+          </a:xfrm>
+          <a:prstGeom prst="rect">
+            <a:avLst/>
+          </a:prstGeom>
+        </p:spPr>
+      </p:pic>
+      <p:sp>
+        <p:nvSpPr>
+          <p:cNvPr id="10" name="Connettore 9">
+            <a:extLst>
+              <a:ext uri="{FF2B5EF4-FFF2-40B4-BE49-F238E27FC236}">
+                <a16:creationId xmlns:a16="http://schemas.microsoft.com/office/drawing/2014/main" id="{7DA3C5E2-1B7C-406E-9A80-B7F344044586}"/>
+              </a:ext>
+            </a:extLst>
+          </p:cNvPr>
+          <p:cNvSpPr/>
+          <p:nvPr/>
+        </p:nvSpPr>
+        <p:spPr>
+          <a:xfrm>
+            <a:off x="11455401" y="6273800"/>
+            <a:ext cx="512910" cy="470291"/>
+          </a:xfrm>
+          <a:prstGeom prst="flowChartConnector">
+            <a:avLst/>
+          </a:prstGeom>
+        </p:spPr>
+        <p:style>
+          <a:lnRef idx="2">
+            <a:schemeClr val="accent1">
+              <a:shade val="50000"/>
+            </a:schemeClr>
+          </a:lnRef>
+          <a:fillRef idx="1">
+            <a:schemeClr val="accent1"/>
+          </a:fillRef>
+          <a:effectRef idx="0">
+            <a:schemeClr val="accent1"/>
+          </a:effectRef>
+          <a:fontRef idx="minor">
+            <a:schemeClr val="lt1"/>
+          </a:fontRef>
+        </p:style>
+        <p:txBody>
+          <a:bodyPr rtlCol="0" anchor="ctr"/>
+          <a:lstStyle/>
+          <a:p>
+            <a:pPr algn="ctr"/>
+            <a:fld id="{3A98EE3D-8CD1-4C3F-BD1C-C98C9596463C}" type="slidenum">
+              <a:rPr lang="it-IT" sz="1200" b="1"/>
+              <a:pPr algn="ctr"/>
+              <a:t>14</a:t>
+            </a:fld>
+            <a:endParaRPr lang="it-IT" b="1" dirty="0"/>
+          </a:p>
+        </p:txBody>
+      </p:sp>
       <p:sp>
         <p:nvSpPr>
           <p:cNvPr id="3" name="Segnaposto contenuto 2">
@@ -10728,7 +11627,7 @@
     </p:spTree>
     <p:extLst>
       <p:ext uri="{BB962C8B-B14F-4D97-AF65-F5344CB8AC3E}">
-        <p14:creationId xmlns:p14="http://schemas.microsoft.com/office/powerpoint/2010/main" val="1318820384"/>
+        <p14:creationId xmlns:p14="http://schemas.microsoft.com/office/powerpoint/2010/main" val="17792931"/>
       </p:ext>
     </p:extLst>
   </p:cSld>
@@ -13717,6 +14616,41 @@
           </a:p>
         </p:txBody>
       </p:sp>
+      <p:sp>
+        <p:nvSpPr>
+          <p:cNvPr id="3" name="CasellaDiTesto 2">
+            <a:extLst>
+              <a:ext uri="{FF2B5EF4-FFF2-40B4-BE49-F238E27FC236}">
+                <a16:creationId xmlns:a16="http://schemas.microsoft.com/office/drawing/2014/main" id="{D88BAB3D-146D-B6EA-B001-4043D91C3323}"/>
+              </a:ext>
+            </a:extLst>
+          </p:cNvPr>
+          <p:cNvSpPr txBox="1"/>
+          <p:nvPr/>
+        </p:nvSpPr>
+        <p:spPr>
+          <a:xfrm>
+            <a:off x="7920718" y="6086143"/>
+            <a:ext cx="2351951" cy="307777"/>
+          </a:xfrm>
+          <a:prstGeom prst="rect">
+            <a:avLst/>
+          </a:prstGeom>
+          <a:noFill/>
+        </p:spPr>
+        <p:txBody>
+          <a:bodyPr wrap="square">
+            <a:spAutoFit/>
+          </a:bodyPr>
+          <a:lstStyle/>
+          <a:p>
+            <a:r>
+              <a:rPr lang="it-IT" sz="1400" dirty="0"/>
+              <a:t>Esempio di script GCODE</a:t>
+            </a:r>
+          </a:p>
+        </p:txBody>
+      </p:sp>
     </p:spTree>
     <p:extLst>
       <p:ext uri="{BB962C8B-B14F-4D97-AF65-F5344CB8AC3E}">
@@ -13939,7 +14873,7 @@
       </p:sp>
       <p:pic>
         <p:nvPicPr>
-          <p:cNvPr id="2" name="Immagine 1">
+          <p:cNvPr id="2" name="Immagine 1" descr=",,,,">
             <a:extLst>
               <a:ext uri="{FF2B5EF4-FFF2-40B4-BE49-F238E27FC236}">
                 <a16:creationId xmlns:a16="http://schemas.microsoft.com/office/drawing/2014/main" id="{DDA3B1E0-6844-6766-3DC3-CB54430922B4}"/>
@@ -13972,6 +14906,41 @@
           </a:ln>
         </p:spPr>
       </p:pic>
+      <p:sp>
+        <p:nvSpPr>
+          <p:cNvPr id="5" name="CasellaDiTesto 4">
+            <a:extLst>
+              <a:ext uri="{FF2B5EF4-FFF2-40B4-BE49-F238E27FC236}">
+                <a16:creationId xmlns:a16="http://schemas.microsoft.com/office/drawing/2014/main" id="{2140843D-52B9-D8B5-4FF0-560E5FE38106}"/>
+              </a:ext>
+            </a:extLst>
+          </p:cNvPr>
+          <p:cNvSpPr txBox="1"/>
+          <p:nvPr/>
+        </p:nvSpPr>
+        <p:spPr>
+          <a:xfrm>
+            <a:off x="7518059" y="4940628"/>
+            <a:ext cx="2796920" cy="307777"/>
+          </a:xfrm>
+          <a:prstGeom prst="rect">
+            <a:avLst/>
+          </a:prstGeom>
+          <a:noFill/>
+        </p:spPr>
+        <p:txBody>
+          <a:bodyPr wrap="none" rtlCol="0">
+            <a:spAutoFit/>
+          </a:bodyPr>
+          <a:lstStyle/>
+          <a:p>
+            <a:r>
+              <a:rPr lang="it-IT" sz="1400" dirty="0"/>
+              <a:t>Interfaccia di presentazione del tool</a:t>
+            </a:r>
+          </a:p>
+        </p:txBody>
+      </p:sp>
     </p:spTree>
     <p:extLst>
       <p:ext uri="{BB962C8B-B14F-4D97-AF65-F5344CB8AC3E}">
@@ -14461,6 +15430,41 @@
           </a:ln>
         </p:spPr>
       </p:pic>
+      <p:sp>
+        <p:nvSpPr>
+          <p:cNvPr id="7" name="CasellaDiTesto 6">
+            <a:extLst>
+              <a:ext uri="{FF2B5EF4-FFF2-40B4-BE49-F238E27FC236}">
+                <a16:creationId xmlns:a16="http://schemas.microsoft.com/office/drawing/2014/main" id="{B54168FB-2D85-1EB7-DB4C-842635D8B944}"/>
+              </a:ext>
+            </a:extLst>
+          </p:cNvPr>
+          <p:cNvSpPr txBox="1"/>
+          <p:nvPr/>
+        </p:nvSpPr>
+        <p:spPr>
+          <a:xfrm>
+            <a:off x="8080328" y="4868991"/>
+            <a:ext cx="1671780" cy="307777"/>
+          </a:xfrm>
+          <a:prstGeom prst="rect">
+            <a:avLst/>
+          </a:prstGeom>
+          <a:noFill/>
+        </p:spPr>
+        <p:txBody>
+          <a:bodyPr wrap="square">
+            <a:spAutoFit/>
+          </a:bodyPr>
+          <a:lstStyle/>
+          <a:p>
+            <a:r>
+              <a:rPr lang="it-IT" sz="1400" dirty="0"/>
+              <a:t>Interfaccia di output</a:t>
+            </a:r>
+          </a:p>
+        </p:txBody>
+      </p:sp>
     </p:spTree>
     <p:extLst>
       <p:ext uri="{BB962C8B-B14F-4D97-AF65-F5344CB8AC3E}">
@@ -15002,6 +16006,41 @@
           </a:ln>
         </p:spPr>
       </p:pic>
+      <p:sp>
+        <p:nvSpPr>
+          <p:cNvPr id="3" name="CasellaDiTesto 2">
+            <a:extLst>
+              <a:ext uri="{FF2B5EF4-FFF2-40B4-BE49-F238E27FC236}">
+                <a16:creationId xmlns:a16="http://schemas.microsoft.com/office/drawing/2014/main" id="{E43493AD-D487-5D8A-1E78-E15E9F0EE27E}"/>
+              </a:ext>
+            </a:extLst>
+          </p:cNvPr>
+          <p:cNvSpPr txBox="1"/>
+          <p:nvPr/>
+        </p:nvSpPr>
+        <p:spPr>
+          <a:xfrm>
+            <a:off x="6637272" y="4649159"/>
+            <a:ext cx="4523220" cy="307777"/>
+          </a:xfrm>
+          <a:prstGeom prst="rect">
+            <a:avLst/>
+          </a:prstGeom>
+          <a:noFill/>
+        </p:spPr>
+        <p:txBody>
+          <a:bodyPr wrap="square">
+            <a:spAutoFit/>
+          </a:bodyPr>
+          <a:lstStyle/>
+          <a:p>
+            <a:r>
+              <a:rPr lang="it-IT" sz="1400" dirty="0"/>
+              <a:t>Traduzione della sezione di configurazione del file di input</a:t>
+            </a:r>
+          </a:p>
+        </p:txBody>
+      </p:sp>
     </p:spTree>
     <p:extLst>
       <p:ext uri="{BB962C8B-B14F-4D97-AF65-F5344CB8AC3E}">
@@ -15889,6 +16928,15 @@
 </file>
 
 <file path=customXml/item1.xml><?xml version="1.0" encoding="utf-8"?>
+<?mso-contentType ?>
+<FormTemplates xmlns="http://schemas.microsoft.com/sharepoint/v3/contenttype/forms">
+  <Display>DocumentLibraryForm</Display>
+  <Edit>DocumentLibraryForm</Edit>
+  <New>DocumentLibraryForm</New>
+</FormTemplates>
+</file>
+
+<file path=customXml/item2.xml><?xml version="1.0" encoding="utf-8"?>
 <ct:contentTypeSchema xmlns:ct="http://schemas.microsoft.com/office/2006/metadata/contentType" xmlns:ma="http://schemas.microsoft.com/office/2006/metadata/properties/metaAttributes" ct:_="" ma:_="" ma:contentTypeName="Document" ma:contentTypeID="0x01010079F111ED35F8CC479449609E8A0923A6" ma:contentTypeVersion="12" ma:contentTypeDescription="Create a new document." ma:contentTypeScope="" ma:versionID="fa6e671f1cd7e4d96ff9652be322dd5e">
   <xsd:schema xmlns:xsd="http://www.w3.org/2001/XMLSchema" xmlns:xs="http://www.w3.org/2001/XMLSchema" xmlns:p="http://schemas.microsoft.com/office/2006/metadata/properties" xmlns:ns2="71af3243-3dd4-4a8d-8c0d-dd76da1f02a5" xmlns:ns3="16c05727-aa75-4e4a-9b5f-8a80a1165891" targetNamespace="http://schemas.microsoft.com/office/2006/metadata/properties" ma:root="true" ma:fieldsID="4e2496f70b101db0b8013f30a071bbf7" ns2:_="" ns3:_="">
     <xsd:import namespace="71af3243-3dd4-4a8d-8c0d-dd76da1f02a5"/>
@@ -16109,15 +17157,6 @@
 </ct:contentTypeSchema>
 </file>
 
-<file path=customXml/item2.xml><?xml version="1.0" encoding="utf-8"?>
-<?mso-contentType ?>
-<FormTemplates xmlns="http://schemas.microsoft.com/sharepoint/v3/contenttype/forms">
-  <Display>DocumentLibraryForm</Display>
-  <Edit>DocumentLibraryForm</Edit>
-  <New>DocumentLibraryForm</New>
-</FormTemplates>
-</file>
-
 <file path=customXml/item3.xml><?xml version="1.0" encoding="utf-8"?>
 <p:properties xmlns:p="http://schemas.microsoft.com/office/2006/metadata/properties" xmlns:xsi="http://www.w3.org/2001/XMLSchema-instance" xmlns:pc="http://schemas.microsoft.com/office/infopath/2007/PartnerControls">
   <documentManagement>
@@ -16128,6 +17167,14 @@
 </file>
 
 <file path=customXml/itemProps1.xml><?xml version="1.0" encoding="utf-8"?>
+<ds:datastoreItem xmlns:ds="http://schemas.openxmlformats.org/officeDocument/2006/customXml" ds:itemID="{7E0A2CB4-6869-426F-8BC4-A32C90CBE263}">
+  <ds:schemaRefs>
+    <ds:schemaRef ds:uri="http://schemas.microsoft.com/sharepoint/v3/contenttype/forms"/>
+  </ds:schemaRefs>
+</ds:datastoreItem>
+</file>
+
+<file path=customXml/itemProps2.xml><?xml version="1.0" encoding="utf-8"?>
 <ds:datastoreItem xmlns:ds="http://schemas.openxmlformats.org/officeDocument/2006/customXml" ds:itemID="{A941CA7C-A0BF-44EF-B2E5-7539C3B9B0B6}">
   <ds:schemaRefs>
     <ds:schemaRef ds:uri="http://schemas.microsoft.com/office/2006/metadata/contentType"/>
@@ -16146,14 +17193,6 @@
 </ds:datastoreItem>
 </file>
 
-<file path=customXml/itemProps2.xml><?xml version="1.0" encoding="utf-8"?>
-<ds:datastoreItem xmlns:ds="http://schemas.openxmlformats.org/officeDocument/2006/customXml" ds:itemID="{7E0A2CB4-6869-426F-8BC4-A32C90CBE263}">
-  <ds:schemaRefs>
-    <ds:schemaRef ds:uri="http://schemas.microsoft.com/sharepoint/v3/contenttype/forms"/>
-  </ds:schemaRefs>
-</ds:datastoreItem>
-</file>
-
 <file path=customXml/itemProps3.xml><?xml version="1.0" encoding="utf-8"?>
 <ds:datastoreItem xmlns:ds="http://schemas.openxmlformats.org/officeDocument/2006/customXml" ds:itemID="{A4E879E6-8FFE-4154-8F2A-F7518B89B376}">
   <ds:schemaRefs>

</xml_diff>